<commit_message>
Version Finale Présentation pptx
</commit_message>
<xml_diff>
--- a/Projet/Presentation/Presentation_Groupe05.pptx
+++ b/Projet/Presentation/Presentation_Groupe05.pptx
@@ -8,17 +8,18 @@
     <p:sldId id="260" r:id="rId2"/>
     <p:sldId id="358" r:id="rId3"/>
     <p:sldId id="359" r:id="rId4"/>
-    <p:sldId id="360" r:id="rId5"/>
-    <p:sldId id="365" r:id="rId6"/>
-    <p:sldId id="361" r:id="rId7"/>
-    <p:sldId id="370" r:id="rId8"/>
-    <p:sldId id="367" r:id="rId9"/>
-    <p:sldId id="363" r:id="rId10"/>
-    <p:sldId id="366" r:id="rId11"/>
-    <p:sldId id="362" r:id="rId12"/>
-    <p:sldId id="369" r:id="rId13"/>
-    <p:sldId id="368" r:id="rId14"/>
-    <p:sldId id="364" r:id="rId15"/>
+    <p:sldId id="371" r:id="rId5"/>
+    <p:sldId id="360" r:id="rId6"/>
+    <p:sldId id="365" r:id="rId7"/>
+    <p:sldId id="361" r:id="rId8"/>
+    <p:sldId id="370" r:id="rId9"/>
+    <p:sldId id="367" r:id="rId10"/>
+    <p:sldId id="363" r:id="rId11"/>
+    <p:sldId id="366" r:id="rId12"/>
+    <p:sldId id="362" r:id="rId13"/>
+    <p:sldId id="369" r:id="rId14"/>
+    <p:sldId id="368" r:id="rId15"/>
+    <p:sldId id="364" r:id="rId16"/>
   </p:sldIdLst>
   <p:sldSz cx="12192000" cy="6858000"/>
   <p:notesSz cx="6858000" cy="9144000"/>
@@ -236,6 +237,7 @@
           <p14:sldIdLst>
             <p14:sldId id="358"/>
             <p14:sldId id="359"/>
+            <p14:sldId id="371"/>
             <p14:sldId id="360"/>
             <p14:sldId id="365"/>
             <p14:sldId id="361"/>
@@ -1860,7 +1862,7 @@
           <p:cNvPr id="2" name="Title 1">
             <a:extLst>
               <a:ext uri="{FF2B5EF4-FFF2-40B4-BE49-F238E27FC236}">
-                <a16:creationId xmlns:a16="http://schemas.microsoft.com/office/drawing/2014/main" xmlns="" id="{75A2D3C5-0BBA-4475-A74A-9B10CE13EB0E}"/>
+                <a16:creationId xmlns="" xmlns:a16="http://schemas.microsoft.com/office/drawing/2014/main" id="{75A2D3C5-0BBA-4475-A74A-9B10CE13EB0E}"/>
               </a:ext>
             </a:extLst>
           </p:cNvPr>
@@ -2024,7 +2026,7 @@
           <p:cNvPr id="2" name="Title 1">
             <a:extLst>
               <a:ext uri="{FF2B5EF4-FFF2-40B4-BE49-F238E27FC236}">
-                <a16:creationId xmlns:a16="http://schemas.microsoft.com/office/drawing/2014/main" xmlns="" id="{45682A82-1886-4648-8B15-A4EEC660AA63}"/>
+                <a16:creationId xmlns="" xmlns:a16="http://schemas.microsoft.com/office/drawing/2014/main" id="{45682A82-1886-4648-8B15-A4EEC660AA63}"/>
               </a:ext>
             </a:extLst>
           </p:cNvPr>
@@ -2987,7 +2989,7 @@
           <p:cNvPr id="2" name="Title 1">
             <a:extLst>
               <a:ext uri="{FF2B5EF4-FFF2-40B4-BE49-F238E27FC236}">
-                <a16:creationId xmlns:a16="http://schemas.microsoft.com/office/drawing/2014/main" xmlns="" id="{A6382AAE-12BB-4123-9126-EC8008489960}"/>
+                <a16:creationId xmlns="" xmlns:a16="http://schemas.microsoft.com/office/drawing/2014/main" id="{A6382AAE-12BB-4123-9126-EC8008489960}"/>
               </a:ext>
             </a:extLst>
           </p:cNvPr>
@@ -5805,7 +5807,7 @@
           <p:cNvPr id="2" name="Picture 2" descr="RÃ©sultat de recherche d'images pour &quot;ynov lyon&quot;">
             <a:extLst>
               <a:ext uri="{FF2B5EF4-FFF2-40B4-BE49-F238E27FC236}">
-                <a16:creationId xmlns:a16="http://schemas.microsoft.com/office/drawing/2014/main" xmlns="" id="{92ABB00D-ADA6-4A5E-80E9-D89620C9233F}"/>
+                <a16:creationId xmlns="" xmlns:a16="http://schemas.microsoft.com/office/drawing/2014/main" id="{92ABB00D-ADA6-4A5E-80E9-D89620C9233F}"/>
               </a:ext>
             </a:extLst>
           </p:cNvPr>
@@ -6332,7 +6334,7 @@
           <p:cNvPr id="3" name="Text Placeholder 2">
             <a:extLst>
               <a:ext uri="{FF2B5EF4-FFF2-40B4-BE49-F238E27FC236}">
-                <a16:creationId xmlns:a16="http://schemas.microsoft.com/office/drawing/2014/main" xmlns="" id="{60DBFCC4-DB58-4F06-97D0-A741F5586722}"/>
+                <a16:creationId xmlns="" xmlns:a16="http://schemas.microsoft.com/office/drawing/2014/main" id="{60DBFCC4-DB58-4F06-97D0-A741F5586722}"/>
               </a:ext>
             </a:extLst>
           </p:cNvPr>
@@ -6365,7 +6367,7 @@
           <p:cNvPr id="1026" name="Picture 2" descr="RÃ©sultat de recherche d'images pour &quot;ynov lyon&quot;">
             <a:extLst>
               <a:ext uri="{FF2B5EF4-FFF2-40B4-BE49-F238E27FC236}">
-                <a16:creationId xmlns:a16="http://schemas.microsoft.com/office/drawing/2014/main" xmlns="" id="{6EB9BD3B-0D8D-4FB9-B6AA-34EEBF39FE67}"/>
+                <a16:creationId xmlns="" xmlns:a16="http://schemas.microsoft.com/office/drawing/2014/main" id="{6EB9BD3B-0D8D-4FB9-B6AA-34EEBF39FE67}"/>
               </a:ext>
             </a:extLst>
           </p:cNvPr>
@@ -6412,7 +6414,7 @@
           <p:cNvPr id="2" name="TextBox 1">
             <a:extLst>
               <a:ext uri="{FF2B5EF4-FFF2-40B4-BE49-F238E27FC236}">
-                <a16:creationId xmlns:a16="http://schemas.microsoft.com/office/drawing/2014/main" xmlns="" id="{0499A71F-347A-4043-B5B9-A2E6917C84E7}"/>
+                <a16:creationId xmlns="" xmlns:a16="http://schemas.microsoft.com/office/drawing/2014/main" id="{0499A71F-347A-4043-B5B9-A2E6917C84E7}"/>
               </a:ext>
             </a:extLst>
           </p:cNvPr>
@@ -6456,7 +6458,7 @@
           <p:cNvPr id="6" name="TextBox 5">
             <a:extLst>
               <a:ext uri="{FF2B5EF4-FFF2-40B4-BE49-F238E27FC236}">
-                <a16:creationId xmlns:a16="http://schemas.microsoft.com/office/drawing/2014/main" xmlns="" id="{A664C523-DC2F-4D39-853C-07F0BFDABF81}"/>
+                <a16:creationId xmlns="" xmlns:a16="http://schemas.microsoft.com/office/drawing/2014/main" id="{A664C523-DC2F-4D39-853C-07F0BFDABF81}"/>
               </a:ext>
             </a:extLst>
           </p:cNvPr>
@@ -6530,7 +6532,7 @@
           <p:cNvPr id="2" name="Text Placeholder 1">
             <a:extLst>
               <a:ext uri="{FF2B5EF4-FFF2-40B4-BE49-F238E27FC236}">
-                <a16:creationId xmlns:a16="http://schemas.microsoft.com/office/drawing/2014/main" xmlns="" id="{53DBDAB2-BE11-4B9D-85BC-5DE3D2A0A607}"/>
+                <a16:creationId xmlns="" xmlns:a16="http://schemas.microsoft.com/office/drawing/2014/main" id="{53DBDAB2-BE11-4B9D-85BC-5DE3D2A0A607}"/>
               </a:ext>
             </a:extLst>
           </p:cNvPr>
@@ -6552,11 +6554,147 @@
             </a:r>
             <a:r>
               <a:rPr lang="en-US" dirty="0" smtClean="0"/>
-              <a:t> 3 : </a:t>
+              <a:t> 2 : </a:t>
             </a:r>
             <a:r>
               <a:rPr lang="en-US" dirty="0" err="1" smtClean="0"/>
-              <a:t>Définition</a:t>
+              <a:t>Mise</a:t>
+            </a:r>
+            <a:r>
+              <a:rPr lang="en-US" dirty="0" smtClean="0"/>
+              <a:t> </a:t>
+            </a:r>
+            <a:r>
+              <a:rPr lang="en-US" dirty="0" err="1" smtClean="0"/>
+              <a:t>en</a:t>
+            </a:r>
+            <a:r>
+              <a:rPr lang="en-US" dirty="0" smtClean="0"/>
+              <a:t> place des </a:t>
+            </a:r>
+            <a:r>
+              <a:rPr lang="en-US" dirty="0" err="1" smtClean="0"/>
+              <a:t>accès</a:t>
+            </a:r>
+            <a:r>
+              <a:rPr lang="en-US" dirty="0" smtClean="0"/>
+              <a:t> à distance aux </a:t>
+            </a:r>
+            <a:r>
+              <a:rPr lang="en-US" dirty="0" err="1" smtClean="0"/>
+              <a:t>données</a:t>
+            </a:r>
+            <a:r>
+              <a:rPr lang="en-US" dirty="0" smtClean="0"/>
+              <a:t> et aux </a:t>
+            </a:r>
+            <a:r>
+              <a:rPr lang="en-US" dirty="0" err="1" smtClean="0"/>
+              <a:t>fonctionnalités</a:t>
+            </a:r>
+            <a:r>
+              <a:rPr lang="en-US" dirty="0" smtClean="0"/>
+              <a:t> à travers </a:t>
+            </a:r>
+            <a:r>
+              <a:rPr lang="en-US" dirty="0" err="1" smtClean="0"/>
+              <a:t>notre</a:t>
+            </a:r>
+            <a:r>
+              <a:rPr lang="en-US" dirty="0" smtClean="0"/>
+              <a:t> application mobile et web. Nous </a:t>
+            </a:r>
+            <a:r>
+              <a:rPr lang="en-US" dirty="0" err="1" smtClean="0"/>
+              <a:t>allons</a:t>
+            </a:r>
+            <a:r>
+              <a:rPr lang="en-US" dirty="0" smtClean="0"/>
+              <a:t> </a:t>
+            </a:r>
+            <a:r>
+              <a:rPr lang="en-US" dirty="0" err="1" smtClean="0"/>
+              <a:t>ici</a:t>
+            </a:r>
+            <a:r>
+              <a:rPr lang="en-US" dirty="0" smtClean="0"/>
+              <a:t> </a:t>
+            </a:r>
+            <a:r>
+              <a:rPr lang="en-US" dirty="0" err="1" smtClean="0"/>
+              <a:t>gérer</a:t>
+            </a:r>
+            <a:r>
+              <a:rPr lang="en-US" dirty="0" smtClean="0"/>
+              <a:t> </a:t>
+            </a:r>
+            <a:r>
+              <a:rPr lang="en-US" dirty="0" err="1" smtClean="0"/>
+              <a:t>toute</a:t>
+            </a:r>
+            <a:r>
+              <a:rPr lang="en-US" dirty="0" smtClean="0"/>
+              <a:t> la </a:t>
+            </a:r>
+            <a:r>
+              <a:rPr lang="en-US" dirty="0" err="1" smtClean="0"/>
+              <a:t>mise</a:t>
+            </a:r>
+            <a:r>
+              <a:rPr lang="en-US" dirty="0" smtClean="0"/>
+              <a:t> </a:t>
+            </a:r>
+            <a:r>
+              <a:rPr lang="en-US" dirty="0" err="1" smtClean="0"/>
+              <a:t>en</a:t>
+            </a:r>
+            <a:r>
+              <a:rPr lang="en-US" dirty="0" smtClean="0"/>
+              <a:t> place de </a:t>
+            </a:r>
+            <a:r>
+              <a:rPr lang="en-US" dirty="0" err="1" smtClean="0"/>
+              <a:t>notre</a:t>
+            </a:r>
+            <a:r>
+              <a:rPr lang="en-US" dirty="0" smtClean="0"/>
+              <a:t> application mobile (et web), </a:t>
+            </a:r>
+            <a:r>
+              <a:rPr lang="en-US" dirty="0" err="1" smtClean="0"/>
+              <a:t>ainsi</a:t>
+            </a:r>
+            <a:r>
+              <a:rPr lang="en-US" dirty="0" smtClean="0"/>
+              <a:t> que les </a:t>
+            </a:r>
+            <a:r>
+              <a:rPr lang="en-US" dirty="0" err="1" smtClean="0"/>
+              <a:t>différentes</a:t>
+            </a:r>
+            <a:r>
+              <a:rPr lang="en-US" dirty="0" smtClean="0"/>
+              <a:t> API </a:t>
+            </a:r>
+            <a:r>
+              <a:rPr lang="en-US" dirty="0" err="1" smtClean="0"/>
+              <a:t>nécessaires</a:t>
+            </a:r>
+            <a:r>
+              <a:rPr lang="en-US" dirty="0" smtClean="0"/>
+              <a:t> pour </a:t>
+            </a:r>
+            <a:r>
+              <a:rPr lang="en-US" dirty="0" err="1" smtClean="0"/>
+              <a:t>accéder</a:t>
+            </a:r>
+            <a:r>
+              <a:rPr lang="en-US" dirty="0" smtClean="0"/>
+              <a:t> aux </a:t>
+            </a:r>
+            <a:r>
+              <a:rPr lang="en-US" dirty="0" err="1" smtClean="0"/>
+              <a:t>données</a:t>
             </a:r>
             <a:r>
               <a:rPr lang="en-US" dirty="0" smtClean="0"/>
@@ -6564,7 +6702,15 @@
             </a:r>
             <a:r>
               <a:rPr lang="en-US" dirty="0" err="1" smtClean="0"/>
-              <a:t>mise</a:t>
+              <a:t>envoyer</a:t>
+            </a:r>
+            <a:r>
+              <a:rPr lang="en-US" dirty="0" smtClean="0"/>
+              <a:t> des instructions aux </a:t>
+            </a:r>
+            <a:r>
+              <a:rPr lang="en-US" dirty="0" err="1" smtClean="0"/>
+              <a:t>appareils</a:t>
             </a:r>
             <a:r>
               <a:rPr lang="en-US" dirty="0" smtClean="0"/>
@@ -6572,91 +6718,7 @@
             </a:r>
             <a:r>
               <a:rPr lang="en-US" dirty="0" err="1" smtClean="0"/>
-              <a:t>en</a:t>
-            </a:r>
-            <a:r>
-              <a:rPr lang="en-US" dirty="0" smtClean="0"/>
-              <a:t> place de la </a:t>
-            </a:r>
-            <a:r>
-              <a:rPr lang="en-US" dirty="0" err="1" smtClean="0"/>
-              <a:t>logique</a:t>
-            </a:r>
-            <a:r>
-              <a:rPr lang="en-US" dirty="0" smtClean="0"/>
-              <a:t> interne du robot. </a:t>
-            </a:r>
-            <a:r>
-              <a:rPr lang="en-US" dirty="0" err="1" smtClean="0"/>
-              <a:t>Ici</a:t>
-            </a:r>
-            <a:r>
-              <a:rPr lang="en-US" dirty="0" smtClean="0"/>
-              <a:t> </a:t>
-            </a:r>
-            <a:r>
-              <a:rPr lang="en-US" dirty="0" err="1" smtClean="0"/>
-              <a:t>il</a:t>
-            </a:r>
-            <a:r>
-              <a:rPr lang="en-US" dirty="0" smtClean="0"/>
-              <a:t> </a:t>
-            </a:r>
-            <a:r>
-              <a:rPr lang="en-US" dirty="0" err="1" smtClean="0"/>
-              <a:t>s’agira</a:t>
-            </a:r>
-            <a:r>
-              <a:rPr lang="en-US" dirty="0" smtClean="0"/>
-              <a:t> de </a:t>
-            </a:r>
-            <a:r>
-              <a:rPr lang="en-US" dirty="0" err="1" smtClean="0"/>
-              <a:t>définir</a:t>
-            </a:r>
-            <a:r>
-              <a:rPr lang="en-US" dirty="0" smtClean="0"/>
-              <a:t> le </a:t>
-            </a:r>
-            <a:r>
-              <a:rPr lang="en-US" dirty="0" err="1" smtClean="0"/>
-              <a:t>comportement</a:t>
-            </a:r>
-            <a:r>
-              <a:rPr lang="en-US" dirty="0" smtClean="0"/>
-              <a:t> </a:t>
-            </a:r>
-            <a:r>
-              <a:rPr lang="en-US" dirty="0" err="1" smtClean="0"/>
-              <a:t>adéquat</a:t>
-            </a:r>
-            <a:r>
-              <a:rPr lang="en-US" dirty="0" smtClean="0"/>
-              <a:t> du robot, </a:t>
-            </a:r>
-            <a:r>
-              <a:rPr lang="en-US" dirty="0" err="1" smtClean="0"/>
-              <a:t>quand</a:t>
-            </a:r>
-            <a:r>
-              <a:rPr lang="en-US" dirty="0" smtClean="0"/>
-              <a:t> </a:t>
-            </a:r>
-            <a:r>
-              <a:rPr lang="en-US" dirty="0" err="1" smtClean="0"/>
-              <a:t>bouger</a:t>
-            </a:r>
-            <a:r>
-              <a:rPr lang="en-US" dirty="0" smtClean="0"/>
-              <a:t>, comment </a:t>
-            </a:r>
-            <a:r>
-              <a:rPr lang="en-US" dirty="0" err="1" smtClean="0"/>
-              <a:t>bouger</a:t>
-            </a:r>
-            <a:r>
-              <a:rPr lang="en-US" dirty="0" smtClean="0"/>
-              <a:t>, etc</a:t>
+              <a:t>distants</a:t>
             </a:r>
             <a:r>
               <a:rPr lang="en-US" dirty="0"/>
@@ -6670,7 +6732,7 @@
           <p:cNvPr id="3" name="Text Placeholder 2">
             <a:extLst>
               <a:ext uri="{FF2B5EF4-FFF2-40B4-BE49-F238E27FC236}">
-                <a16:creationId xmlns:a16="http://schemas.microsoft.com/office/drawing/2014/main" xmlns="" id="{EBDB337E-4389-4B90-8B96-853A42017204}"/>
+                <a16:creationId xmlns="" xmlns:a16="http://schemas.microsoft.com/office/drawing/2014/main" id="{EBDB337E-4389-4B90-8B96-853A42017204}"/>
               </a:ext>
             </a:extLst>
           </p:cNvPr>
@@ -6707,7 +6769,7 @@
           <p:cNvPr id="4" name="Title 3">
             <a:extLst>
               <a:ext uri="{FF2B5EF4-FFF2-40B4-BE49-F238E27FC236}">
-                <a16:creationId xmlns:a16="http://schemas.microsoft.com/office/drawing/2014/main" xmlns="" id="{F9ED67B2-9414-4565-B91A-5A6339FF2E1B}"/>
+                <a16:creationId xmlns="" xmlns:a16="http://schemas.microsoft.com/office/drawing/2014/main" id="{F9ED67B2-9414-4565-B91A-5A6339FF2E1B}"/>
               </a:ext>
             </a:extLst>
           </p:cNvPr>
@@ -6737,7 +6799,7 @@
             </a:r>
             <a:r>
               <a:rPr lang="fr-FR" dirty="0" smtClean="0"/>
-              <a:t>[3/3]</a:t>
+              <a:t>[2/3]</a:t>
             </a:r>
             <a:endParaRPr lang="en-US" dirty="0"/>
           </a:p>
@@ -6746,7 +6808,7 @@
     </p:spTree>
     <p:extLst>
       <p:ext uri="{BB962C8B-B14F-4D97-AF65-F5344CB8AC3E}">
-        <p14:creationId xmlns:p14="http://schemas.microsoft.com/office/powerpoint/2010/main" val="3411312211"/>
+        <p14:creationId xmlns:p14="http://schemas.microsoft.com/office/powerpoint/2010/main" val="53273876"/>
       </p:ext>
     </p:extLst>
   </p:cSld>
@@ -6778,7 +6840,7 @@
           <p:cNvPr id="2" name="Text Placeholder 1">
             <a:extLst>
               <a:ext uri="{FF2B5EF4-FFF2-40B4-BE49-F238E27FC236}">
-                <a16:creationId xmlns:a16="http://schemas.microsoft.com/office/drawing/2014/main" xmlns="" id="{62737593-5087-4FE7-BE7B-97290A8959AA}"/>
+                <a16:creationId xmlns="" xmlns:a16="http://schemas.microsoft.com/office/drawing/2014/main" id="{53DBDAB2-BE11-4B9D-85BC-5DE3D2A0A607}"/>
               </a:ext>
             </a:extLst>
           </p:cNvPr>
@@ -6789,6 +6851,254 @@
             <p:ph type="body" idx="1"/>
           </p:nvPr>
         </p:nvSpPr>
+        <p:spPr/>
+        <p:txBody>
+          <a:bodyPr/>
+          <a:lstStyle/>
+          <a:p>
+            <a:r>
+              <a:rPr lang="en-US" dirty="0" err="1" smtClean="0"/>
+              <a:t>Tâche</a:t>
+            </a:r>
+            <a:r>
+              <a:rPr lang="en-US" dirty="0" smtClean="0"/>
+              <a:t> 3 : </a:t>
+            </a:r>
+            <a:r>
+              <a:rPr lang="en-US" dirty="0" err="1" smtClean="0"/>
+              <a:t>Définition</a:t>
+            </a:r>
+            <a:r>
+              <a:rPr lang="en-US" dirty="0" smtClean="0"/>
+              <a:t> et </a:t>
+            </a:r>
+            <a:r>
+              <a:rPr lang="en-US" dirty="0" err="1" smtClean="0"/>
+              <a:t>mise</a:t>
+            </a:r>
+            <a:r>
+              <a:rPr lang="en-US" dirty="0" smtClean="0"/>
+              <a:t> </a:t>
+            </a:r>
+            <a:r>
+              <a:rPr lang="en-US" dirty="0" err="1" smtClean="0"/>
+              <a:t>en</a:t>
+            </a:r>
+            <a:r>
+              <a:rPr lang="en-US" dirty="0" smtClean="0"/>
+              <a:t> place de la </a:t>
+            </a:r>
+            <a:r>
+              <a:rPr lang="en-US" dirty="0" err="1" smtClean="0"/>
+              <a:t>logique</a:t>
+            </a:r>
+            <a:r>
+              <a:rPr lang="en-US" dirty="0" smtClean="0"/>
+              <a:t> interne du robot. </a:t>
+            </a:r>
+            <a:r>
+              <a:rPr lang="en-US" dirty="0" err="1" smtClean="0"/>
+              <a:t>Ici</a:t>
+            </a:r>
+            <a:r>
+              <a:rPr lang="en-US" dirty="0" smtClean="0"/>
+              <a:t> </a:t>
+            </a:r>
+            <a:r>
+              <a:rPr lang="en-US" dirty="0" err="1" smtClean="0"/>
+              <a:t>il</a:t>
+            </a:r>
+            <a:r>
+              <a:rPr lang="en-US" dirty="0" smtClean="0"/>
+              <a:t> </a:t>
+            </a:r>
+            <a:r>
+              <a:rPr lang="en-US" dirty="0" err="1" smtClean="0"/>
+              <a:t>s’agira</a:t>
+            </a:r>
+            <a:r>
+              <a:rPr lang="en-US" dirty="0" smtClean="0"/>
+              <a:t> de </a:t>
+            </a:r>
+            <a:r>
+              <a:rPr lang="en-US" dirty="0" err="1" smtClean="0"/>
+              <a:t>définir</a:t>
+            </a:r>
+            <a:r>
+              <a:rPr lang="en-US" dirty="0" smtClean="0"/>
+              <a:t> le </a:t>
+            </a:r>
+            <a:r>
+              <a:rPr lang="en-US" dirty="0" err="1" smtClean="0"/>
+              <a:t>comportement</a:t>
+            </a:r>
+            <a:r>
+              <a:rPr lang="en-US" dirty="0" smtClean="0"/>
+              <a:t> </a:t>
+            </a:r>
+            <a:r>
+              <a:rPr lang="en-US" dirty="0" err="1" smtClean="0"/>
+              <a:t>adéquat</a:t>
+            </a:r>
+            <a:r>
+              <a:rPr lang="en-US" dirty="0" smtClean="0"/>
+              <a:t> du robot, </a:t>
+            </a:r>
+            <a:r>
+              <a:rPr lang="en-US" dirty="0" err="1" smtClean="0"/>
+              <a:t>quand</a:t>
+            </a:r>
+            <a:r>
+              <a:rPr lang="en-US" dirty="0" smtClean="0"/>
+              <a:t> </a:t>
+            </a:r>
+            <a:r>
+              <a:rPr lang="en-US" dirty="0" err="1" smtClean="0"/>
+              <a:t>bouger</a:t>
+            </a:r>
+            <a:r>
+              <a:rPr lang="en-US" dirty="0" smtClean="0"/>
+              <a:t>, comment </a:t>
+            </a:r>
+            <a:r>
+              <a:rPr lang="en-US" dirty="0" err="1" smtClean="0"/>
+              <a:t>bouger</a:t>
+            </a:r>
+            <a:r>
+              <a:rPr lang="en-US" dirty="0" smtClean="0"/>
+              <a:t>, etc</a:t>
+            </a:r>
+            <a:r>
+              <a:rPr lang="en-US" dirty="0"/>
+              <a:t>.</a:t>
+            </a:r>
+          </a:p>
+        </p:txBody>
+      </p:sp>
+      <p:sp>
+        <p:nvSpPr>
+          <p:cNvPr id="3" name="Text Placeholder 2">
+            <a:extLst>
+              <a:ext uri="{FF2B5EF4-FFF2-40B4-BE49-F238E27FC236}">
+                <a16:creationId xmlns="" xmlns:a16="http://schemas.microsoft.com/office/drawing/2014/main" id="{EBDB337E-4389-4B90-8B96-853A42017204}"/>
+              </a:ext>
+            </a:extLst>
+          </p:cNvPr>
+          <p:cNvSpPr>
+            <a:spLocks noGrp="1"/>
+          </p:cNvSpPr>
+          <p:nvPr>
+            <p:ph type="body" sz="quarter" idx="12"/>
+          </p:nvPr>
+        </p:nvSpPr>
+        <p:spPr/>
+        <p:txBody>
+          <a:bodyPr/>
+          <a:lstStyle/>
+          <a:p>
+            <a:r>
+              <a:rPr lang="fr-FR" dirty="0" smtClean="0"/>
+              <a:t>&lt;</a:t>
+            </a:r>
+            <a:r>
+              <a:rPr lang="fr-FR" dirty="0" err="1" smtClean="0"/>
+              <a:t>poTech</a:t>
+            </a:r>
+            <a:r>
+              <a:rPr lang="fr-FR" dirty="0" smtClean="0"/>
+              <a:t>&gt;</a:t>
+            </a:r>
+            <a:endParaRPr lang="en-US" dirty="0"/>
+          </a:p>
+        </p:txBody>
+      </p:sp>
+      <p:sp>
+        <p:nvSpPr>
+          <p:cNvPr id="4" name="Title 3">
+            <a:extLst>
+              <a:ext uri="{FF2B5EF4-FFF2-40B4-BE49-F238E27FC236}">
+                <a16:creationId xmlns="" xmlns:a16="http://schemas.microsoft.com/office/drawing/2014/main" id="{F9ED67B2-9414-4565-B91A-5A6339FF2E1B}"/>
+              </a:ext>
+            </a:extLst>
+          </p:cNvPr>
+          <p:cNvSpPr>
+            <a:spLocks noGrp="1"/>
+          </p:cNvSpPr>
+          <p:nvPr>
+            <p:ph type="title"/>
+          </p:nvPr>
+        </p:nvSpPr>
+        <p:spPr/>
+        <p:txBody>
+          <a:bodyPr/>
+          <a:lstStyle/>
+          <a:p>
+            <a:r>
+              <a:rPr lang="fr-FR" dirty="0"/>
+              <a:t>Project </a:t>
+            </a:r>
+            <a:r>
+              <a:rPr lang="fr-FR" dirty="0" err="1"/>
+              <a:t>Tasks</a:t>
+            </a:r>
+            <a:r>
+              <a:rPr lang="fr-FR" dirty="0"/>
+              <a:t> </a:t>
+            </a:r>
+            <a:r>
+              <a:rPr lang="fr-FR" dirty="0" smtClean="0"/>
+              <a:t>[3/3]</a:t>
+            </a:r>
+            <a:endParaRPr lang="en-US" dirty="0"/>
+          </a:p>
+        </p:txBody>
+      </p:sp>
+    </p:spTree>
+    <p:extLst>
+      <p:ext uri="{BB962C8B-B14F-4D97-AF65-F5344CB8AC3E}">
+        <p14:creationId xmlns:p14="http://schemas.microsoft.com/office/powerpoint/2010/main" val="3411312211"/>
+      </p:ext>
+    </p:extLst>
+  </p:cSld>
+  <p:clrMapOvr>
+    <a:masterClrMapping/>
+  </p:clrMapOvr>
+</p:sld>
+</file>
+
+<file path=ppt/slides/slide12.xml><?xml version="1.0" encoding="utf-8"?>
+<p:sld xmlns:a="http://schemas.openxmlformats.org/drawingml/2006/main" xmlns:r="http://schemas.openxmlformats.org/officeDocument/2006/relationships" xmlns:p="http://schemas.openxmlformats.org/presentationml/2006/main">
+  <p:cSld>
+    <p:spTree>
+      <p:nvGrpSpPr>
+        <p:cNvPr id="1" name=""/>
+        <p:cNvGrpSpPr/>
+        <p:nvPr/>
+      </p:nvGrpSpPr>
+      <p:grpSpPr>
+        <a:xfrm>
+          <a:off x="0" y="0"/>
+          <a:ext cx="0" cy="0"/>
+          <a:chOff x="0" y="0"/>
+          <a:chExt cx="0" cy="0"/>
+        </a:xfrm>
+      </p:grpSpPr>
+      <p:sp>
+        <p:nvSpPr>
+          <p:cNvPr id="2" name="Text Placeholder 1">
+            <a:extLst>
+              <a:ext uri="{FF2B5EF4-FFF2-40B4-BE49-F238E27FC236}">
+                <a16:creationId xmlns="" xmlns:a16="http://schemas.microsoft.com/office/drawing/2014/main" id="{62737593-5087-4FE7-BE7B-97290A8959AA}"/>
+              </a:ext>
+            </a:extLst>
+          </p:cNvPr>
+          <p:cNvSpPr>
+            <a:spLocks noGrp="1"/>
+          </p:cNvSpPr>
+          <p:nvPr>
+            <p:ph type="body" idx="1"/>
+          </p:nvPr>
+        </p:nvSpPr>
         <p:spPr>
           <a:xfrm>
             <a:off x="457030" y="2182721"/>
@@ -6820,7 +7130,7 @@
           <p:cNvPr id="3" name="Text Placeholder 2">
             <a:extLst>
               <a:ext uri="{FF2B5EF4-FFF2-40B4-BE49-F238E27FC236}">
-                <a16:creationId xmlns:a16="http://schemas.microsoft.com/office/drawing/2014/main" xmlns="" id="{8013265B-6882-42AD-B306-1AACB5831960}"/>
+                <a16:creationId xmlns="" xmlns:a16="http://schemas.microsoft.com/office/drawing/2014/main" id="{8013265B-6882-42AD-B306-1AACB5831960}"/>
               </a:ext>
             </a:extLst>
           </p:cNvPr>
@@ -6857,7 +7167,7 @@
           <p:cNvPr id="4" name="Title 3">
             <a:extLst>
               <a:ext uri="{FF2B5EF4-FFF2-40B4-BE49-F238E27FC236}">
-                <a16:creationId xmlns:a16="http://schemas.microsoft.com/office/drawing/2014/main" xmlns="" id="{B58880D4-F928-4BAB-8F86-FB3A27D3AE1E}"/>
+                <a16:creationId xmlns="" xmlns:a16="http://schemas.microsoft.com/office/drawing/2014/main" id="{B58880D4-F928-4BAB-8F86-FB3A27D3AE1E}"/>
               </a:ext>
             </a:extLst>
           </p:cNvPr>
@@ -6922,199 +7232,6 @@
 </p:sld>
 </file>
 
-<file path=ppt/slides/slide12.xml><?xml version="1.0" encoding="utf-8"?>
-<p:sld xmlns:a="http://schemas.openxmlformats.org/drawingml/2006/main" xmlns:r="http://schemas.openxmlformats.org/officeDocument/2006/relationships" xmlns:p="http://schemas.openxmlformats.org/presentationml/2006/main">
-  <p:cSld>
-    <p:spTree>
-      <p:nvGrpSpPr>
-        <p:cNvPr id="1" name=""/>
-        <p:cNvGrpSpPr/>
-        <p:nvPr/>
-      </p:nvGrpSpPr>
-      <p:grpSpPr>
-        <a:xfrm>
-          <a:off x="0" y="0"/>
-          <a:ext cx="0" cy="0"/>
-          <a:chOff x="0" y="0"/>
-          <a:chExt cx="0" cy="0"/>
-        </a:xfrm>
-      </p:grpSpPr>
-      <p:sp>
-        <p:nvSpPr>
-          <p:cNvPr id="2" name="Text Placeholder 1">
-            <a:extLst>
-              <a:ext uri="{FF2B5EF4-FFF2-40B4-BE49-F238E27FC236}">
-                <a16:creationId xmlns:a16="http://schemas.microsoft.com/office/drawing/2014/main" xmlns="" id="{62737593-5087-4FE7-BE7B-97290A8959AA}"/>
-              </a:ext>
-            </a:extLst>
-          </p:cNvPr>
-          <p:cNvSpPr>
-            <a:spLocks noGrp="1"/>
-          </p:cNvSpPr>
-          <p:nvPr>
-            <p:ph type="body" idx="1"/>
-          </p:nvPr>
-        </p:nvSpPr>
-        <p:spPr/>
-        <p:txBody>
-          <a:bodyPr/>
-          <a:lstStyle/>
-          <a:p>
-            <a:r>
-              <a:rPr lang="fr-FR" dirty="0"/>
-              <a:t>Notre planning concerne les 4 jours de développement mis à disposition.</a:t>
-            </a:r>
-          </a:p>
-          <a:p>
-            <a:r>
-              <a:rPr lang="fr-FR" dirty="0"/>
-              <a:t>Nous sommes 3, cependant les deux premiers jours de travail un membre de notre équipe sera absent.</a:t>
-            </a:r>
-          </a:p>
-          <a:p>
-            <a:endParaRPr lang="fr-FR" dirty="0"/>
-          </a:p>
-          <a:p>
-            <a:r>
-              <a:rPr lang="fr-FR" dirty="0"/>
-              <a:t>Ainsi le planning prévisionnel (à préciser) sera le suivant :</a:t>
-            </a:r>
-          </a:p>
-          <a:p>
-            <a:endParaRPr lang="fr-FR" dirty="0"/>
-          </a:p>
-          <a:p>
-            <a:r>
-              <a:rPr lang="fr-FR" dirty="0"/>
-              <a:t>Jour 1 : Alexandre sur le paramétrage de la </a:t>
-            </a:r>
-            <a:r>
-              <a:rPr lang="fr-FR" dirty="0" err="1"/>
-              <a:t>gateway</a:t>
-            </a:r>
-            <a:r>
-              <a:rPr lang="fr-FR" dirty="0"/>
-              <a:t> et du robot, </a:t>
-            </a:r>
-            <a:r>
-              <a:rPr lang="fr-FR" dirty="0" err="1"/>
-              <a:t>Saber</a:t>
-            </a:r>
-            <a:r>
-              <a:rPr lang="fr-FR" dirty="0"/>
-              <a:t> sur la création de l’application mobile.</a:t>
-            </a:r>
-          </a:p>
-          <a:p>
-            <a:endParaRPr lang="fr-FR" dirty="0"/>
-          </a:p>
-          <a:p>
-            <a:r>
-              <a:rPr lang="fr-FR" dirty="0"/>
-              <a:t>Jour 2 : Alexandre sur la mise en place du service, le contrôle des sondes et des accès aux différents composants, </a:t>
-            </a:r>
-            <a:r>
-              <a:rPr lang="fr-FR" dirty="0" err="1"/>
-              <a:t>Saber</a:t>
-            </a:r>
-            <a:r>
-              <a:rPr lang="fr-FR" dirty="0"/>
-              <a:t> sur la finalisation de l’application et sur la mise en place des accès à distance aux fonctionnalités.</a:t>
-            </a:r>
-          </a:p>
-        </p:txBody>
-      </p:sp>
-      <p:sp>
-        <p:nvSpPr>
-          <p:cNvPr id="3" name="Text Placeholder 2">
-            <a:extLst>
-              <a:ext uri="{FF2B5EF4-FFF2-40B4-BE49-F238E27FC236}">
-                <a16:creationId xmlns:a16="http://schemas.microsoft.com/office/drawing/2014/main" xmlns="" id="{8013265B-6882-42AD-B306-1AACB5831960}"/>
-              </a:ext>
-            </a:extLst>
-          </p:cNvPr>
-          <p:cNvSpPr>
-            <a:spLocks noGrp="1"/>
-          </p:cNvSpPr>
-          <p:nvPr>
-            <p:ph type="body" sz="quarter" idx="12"/>
-          </p:nvPr>
-        </p:nvSpPr>
-        <p:spPr/>
-        <p:txBody>
-          <a:bodyPr/>
-          <a:lstStyle/>
-          <a:p>
-            <a:r>
-              <a:rPr lang="fr-FR" dirty="0" smtClean="0"/>
-              <a:t>&lt;</a:t>
-            </a:r>
-            <a:r>
-              <a:rPr lang="fr-FR" dirty="0" err="1" smtClean="0"/>
-              <a:t>poTech</a:t>
-            </a:r>
-            <a:r>
-              <a:rPr lang="fr-FR" dirty="0" smtClean="0"/>
-              <a:t>&gt;</a:t>
-            </a:r>
-            <a:endParaRPr lang="en-US" dirty="0"/>
-          </a:p>
-        </p:txBody>
-      </p:sp>
-      <p:sp>
-        <p:nvSpPr>
-          <p:cNvPr id="4" name="Title 3">
-            <a:extLst>
-              <a:ext uri="{FF2B5EF4-FFF2-40B4-BE49-F238E27FC236}">
-                <a16:creationId xmlns:a16="http://schemas.microsoft.com/office/drawing/2014/main" xmlns="" id="{B58880D4-F928-4BAB-8F86-FB3A27D3AE1E}"/>
-              </a:ext>
-            </a:extLst>
-          </p:cNvPr>
-          <p:cNvSpPr>
-            <a:spLocks noGrp="1"/>
-          </p:cNvSpPr>
-          <p:nvPr>
-            <p:ph type="title"/>
-          </p:nvPr>
-        </p:nvSpPr>
-        <p:spPr/>
-        <p:txBody>
-          <a:bodyPr/>
-          <a:lstStyle/>
-          <a:p>
-            <a:r>
-              <a:rPr lang="fr-FR" dirty="0"/>
-              <a:t>Product </a:t>
-            </a:r>
-            <a:r>
-              <a:rPr lang="fr-FR" dirty="0" smtClean="0"/>
-              <a:t>Planning [</a:t>
-            </a:r>
-            <a:r>
-              <a:rPr lang="fr-FR" dirty="0"/>
-              <a:t>2</a:t>
-            </a:r>
-            <a:r>
-              <a:rPr lang="fr-FR" dirty="0" smtClean="0"/>
-              <a:t>/3]</a:t>
-            </a:r>
-            <a:endParaRPr lang="en-US" dirty="0"/>
-          </a:p>
-        </p:txBody>
-      </p:sp>
-    </p:spTree>
-    <p:extLst>
-      <p:ext uri="{BB962C8B-B14F-4D97-AF65-F5344CB8AC3E}">
-        <p14:creationId xmlns:p14="http://schemas.microsoft.com/office/powerpoint/2010/main" val="3843562291"/>
-      </p:ext>
-    </p:extLst>
-  </p:cSld>
-  <p:clrMapOvr>
-    <a:masterClrMapping/>
-  </p:clrMapOvr>
-</p:sld>
-</file>
-
 <file path=ppt/slides/slide13.xml><?xml version="1.0" encoding="utf-8"?>
 <p:sld xmlns:a="http://schemas.openxmlformats.org/drawingml/2006/main" xmlns:r="http://schemas.openxmlformats.org/officeDocument/2006/relationships" xmlns:p="http://schemas.openxmlformats.org/presentationml/2006/main">
   <p:cSld>
@@ -7137,7 +7254,7 @@
           <p:cNvPr id="2" name="Text Placeholder 1">
             <a:extLst>
               <a:ext uri="{FF2B5EF4-FFF2-40B4-BE49-F238E27FC236}">
-                <a16:creationId xmlns:a16="http://schemas.microsoft.com/office/drawing/2014/main" xmlns="" id="{62737593-5087-4FE7-BE7B-97290A8959AA}"/>
+                <a16:creationId xmlns="" xmlns:a16="http://schemas.microsoft.com/office/drawing/2014/main" id="{62737593-5087-4FE7-BE7B-97290A8959AA}"/>
               </a:ext>
             </a:extLst>
           </p:cNvPr>
@@ -7155,7 +7272,39 @@
           <a:p>
             <a:r>
               <a:rPr lang="fr-FR" dirty="0"/>
-              <a:t>Jour 3 : Guillaume sur la vérification du paramétrage et de l’installation, Alexandre et </a:t>
+              <a:t>Notre planning concerne les 4 jours de développement mis à disposition.</a:t>
+            </a:r>
+          </a:p>
+          <a:p>
+            <a:r>
+              <a:rPr lang="fr-FR" dirty="0"/>
+              <a:t>Nous sommes 3, cependant les deux premiers jours de travail un membre de notre équipe sera absent.</a:t>
+            </a:r>
+          </a:p>
+          <a:p>
+            <a:endParaRPr lang="fr-FR" dirty="0"/>
+          </a:p>
+          <a:p>
+            <a:r>
+              <a:rPr lang="fr-FR" dirty="0"/>
+              <a:t>Ainsi le planning prévisionnel (à préciser) sera le suivant :</a:t>
+            </a:r>
+          </a:p>
+          <a:p>
+            <a:endParaRPr lang="fr-FR" dirty="0"/>
+          </a:p>
+          <a:p>
+            <a:r>
+              <a:rPr lang="fr-FR" dirty="0"/>
+              <a:t>Jour 1 : Alexandre sur le paramétrage de la </a:t>
+            </a:r>
+            <a:r>
+              <a:rPr lang="fr-FR" dirty="0" err="1"/>
+              <a:t>gateway</a:t>
+            </a:r>
+            <a:r>
+              <a:rPr lang="fr-FR" dirty="0"/>
+              <a:t> et du robot, </a:t>
             </a:r>
             <a:r>
               <a:rPr lang="fr-FR" dirty="0" err="1"/>
@@ -7163,32 +7312,16 @@
             </a:r>
             <a:r>
               <a:rPr lang="fr-FR" dirty="0"/>
-              <a:t> sur les </a:t>
-            </a:r>
-            <a:r>
-              <a:rPr lang="fr-FR" dirty="0" err="1"/>
-              <a:t>algo</a:t>
-            </a:r>
+              <a:t> sur la création de l’application mobile.</a:t>
+            </a:r>
+          </a:p>
+          <a:p>
+            <a:endParaRPr lang="fr-FR" dirty="0"/>
+          </a:p>
+          <a:p>
             <a:r>
               <a:rPr lang="fr-FR" dirty="0"/>
-              <a:t> liés à la logique du robot (gestion des déplacements, </a:t>
-            </a:r>
-            <a:r>
-              <a:rPr lang="fr-FR" dirty="0" err="1"/>
-              <a:t>etc</a:t>
-            </a:r>
-            <a:r>
-              <a:rPr lang="fr-FR" dirty="0"/>
-              <a:t>).</a:t>
-            </a:r>
-          </a:p>
-          <a:p>
-            <a:endParaRPr lang="fr-FR" dirty="0"/>
-          </a:p>
-          <a:p>
-            <a:r>
-              <a:rPr lang="fr-FR" dirty="0"/>
-              <a:t>Jour 4 : </a:t>
+              <a:t>Jour 2 : Alexandre sur la mise en place du service, le contrôle des sondes et des accès aux différents composants, </a:t>
             </a:r>
             <a:r>
               <a:rPr lang="fr-FR" dirty="0" err="1"/>
@@ -7196,7 +7329,7 @@
             </a:r>
             <a:r>
               <a:rPr lang="fr-FR" dirty="0"/>
-              <a:t> sur la finalisation de l’accès à distance aux déplacements, Alexandre sur la mise en forme des informations sur l’appli et Guillaume sur l’analyse du comportement et le retour de bugs.</a:t>
+              <a:t> sur la finalisation de l’application et sur la mise en place des accès à distance aux fonctionnalités.</a:t>
             </a:r>
           </a:p>
         </p:txBody>
@@ -7206,7 +7339,7 @@
           <p:cNvPr id="3" name="Text Placeholder 2">
             <a:extLst>
               <a:ext uri="{FF2B5EF4-FFF2-40B4-BE49-F238E27FC236}">
-                <a16:creationId xmlns:a16="http://schemas.microsoft.com/office/drawing/2014/main" xmlns="" id="{8013265B-6882-42AD-B306-1AACB5831960}"/>
+                <a16:creationId xmlns="" xmlns:a16="http://schemas.microsoft.com/office/drawing/2014/main" id="{8013265B-6882-42AD-B306-1AACB5831960}"/>
               </a:ext>
             </a:extLst>
           </p:cNvPr>
@@ -7243,7 +7376,7 @@
           <p:cNvPr id="4" name="Title 3">
             <a:extLst>
               <a:ext uri="{FF2B5EF4-FFF2-40B4-BE49-F238E27FC236}">
-                <a16:creationId xmlns:a16="http://schemas.microsoft.com/office/drawing/2014/main" xmlns="" id="{B58880D4-F928-4BAB-8F86-FB3A27D3AE1E}"/>
+                <a16:creationId xmlns="" xmlns:a16="http://schemas.microsoft.com/office/drawing/2014/main" id="{B58880D4-F928-4BAB-8F86-FB3A27D3AE1E}"/>
               </a:ext>
             </a:extLst>
           </p:cNvPr>
@@ -7265,7 +7398,15 @@
             </a:r>
             <a:r>
               <a:rPr lang="fr-FR" dirty="0" smtClean="0"/>
-              <a:t>Planning [3/3]</a:t>
+              <a:t>Planning [</a:t>
+            </a:r>
+            <a:r>
+              <a:rPr lang="fr-FR" dirty="0"/>
+              <a:t>2</a:t>
+            </a:r>
+            <a:r>
+              <a:rPr lang="fr-FR" dirty="0" smtClean="0"/>
+              <a:t>/3]</a:t>
             </a:r>
             <a:endParaRPr lang="en-US" dirty="0"/>
           </a:p>
@@ -7274,7 +7415,7 @@
     </p:spTree>
     <p:extLst>
       <p:ext uri="{BB962C8B-B14F-4D97-AF65-F5344CB8AC3E}">
-        <p14:creationId xmlns:p14="http://schemas.microsoft.com/office/powerpoint/2010/main" val="525688119"/>
+        <p14:creationId xmlns:p14="http://schemas.microsoft.com/office/powerpoint/2010/main" val="3843562291"/>
       </p:ext>
     </p:extLst>
   </p:cSld>
@@ -7306,7 +7447,7 @@
           <p:cNvPr id="2" name="Text Placeholder 1">
             <a:extLst>
               <a:ext uri="{FF2B5EF4-FFF2-40B4-BE49-F238E27FC236}">
-                <a16:creationId xmlns:a16="http://schemas.microsoft.com/office/drawing/2014/main" xmlns="" id="{576D1632-C889-465C-A567-CA185B1F9244}"/>
+                <a16:creationId xmlns="" xmlns:a16="http://schemas.microsoft.com/office/drawing/2014/main" id="{62737593-5087-4FE7-BE7B-97290A8959AA}"/>
               </a:ext>
             </a:extLst>
           </p:cNvPr>
@@ -7317,6 +7458,175 @@
             <p:ph type="body" idx="1"/>
           </p:nvPr>
         </p:nvSpPr>
+        <p:spPr/>
+        <p:txBody>
+          <a:bodyPr/>
+          <a:lstStyle/>
+          <a:p>
+            <a:r>
+              <a:rPr lang="fr-FR" dirty="0"/>
+              <a:t>Jour 3 : Guillaume sur la vérification du paramétrage et de l’installation, Alexandre et </a:t>
+            </a:r>
+            <a:r>
+              <a:rPr lang="fr-FR" dirty="0" err="1"/>
+              <a:t>Saber</a:t>
+            </a:r>
+            <a:r>
+              <a:rPr lang="fr-FR" dirty="0"/>
+              <a:t> sur les </a:t>
+            </a:r>
+            <a:r>
+              <a:rPr lang="fr-FR" dirty="0" err="1"/>
+              <a:t>algo</a:t>
+            </a:r>
+            <a:r>
+              <a:rPr lang="fr-FR" dirty="0"/>
+              <a:t> liés à la logique du robot (gestion des déplacements, </a:t>
+            </a:r>
+            <a:r>
+              <a:rPr lang="fr-FR" dirty="0" err="1"/>
+              <a:t>etc</a:t>
+            </a:r>
+            <a:r>
+              <a:rPr lang="fr-FR" dirty="0"/>
+              <a:t>).</a:t>
+            </a:r>
+          </a:p>
+          <a:p>
+            <a:endParaRPr lang="fr-FR" dirty="0"/>
+          </a:p>
+          <a:p>
+            <a:r>
+              <a:rPr lang="fr-FR" dirty="0"/>
+              <a:t>Jour 4 : </a:t>
+            </a:r>
+            <a:r>
+              <a:rPr lang="fr-FR" dirty="0" err="1"/>
+              <a:t>Saber</a:t>
+            </a:r>
+            <a:r>
+              <a:rPr lang="fr-FR" dirty="0"/>
+              <a:t> sur la finalisation de l’accès à distance aux déplacements, Alexandre sur la mise en forme des informations sur l’appli et Guillaume sur l’analyse du comportement et le retour de bugs.</a:t>
+            </a:r>
+          </a:p>
+        </p:txBody>
+      </p:sp>
+      <p:sp>
+        <p:nvSpPr>
+          <p:cNvPr id="3" name="Text Placeholder 2">
+            <a:extLst>
+              <a:ext uri="{FF2B5EF4-FFF2-40B4-BE49-F238E27FC236}">
+                <a16:creationId xmlns="" xmlns:a16="http://schemas.microsoft.com/office/drawing/2014/main" id="{8013265B-6882-42AD-B306-1AACB5831960}"/>
+              </a:ext>
+            </a:extLst>
+          </p:cNvPr>
+          <p:cNvSpPr>
+            <a:spLocks noGrp="1"/>
+          </p:cNvSpPr>
+          <p:nvPr>
+            <p:ph type="body" sz="quarter" idx="12"/>
+          </p:nvPr>
+        </p:nvSpPr>
+        <p:spPr/>
+        <p:txBody>
+          <a:bodyPr/>
+          <a:lstStyle/>
+          <a:p>
+            <a:r>
+              <a:rPr lang="fr-FR" dirty="0" smtClean="0"/>
+              <a:t>&lt;</a:t>
+            </a:r>
+            <a:r>
+              <a:rPr lang="fr-FR" dirty="0" err="1" smtClean="0"/>
+              <a:t>poTech</a:t>
+            </a:r>
+            <a:r>
+              <a:rPr lang="fr-FR" dirty="0" smtClean="0"/>
+              <a:t>&gt;</a:t>
+            </a:r>
+            <a:endParaRPr lang="en-US" dirty="0"/>
+          </a:p>
+        </p:txBody>
+      </p:sp>
+      <p:sp>
+        <p:nvSpPr>
+          <p:cNvPr id="4" name="Title 3">
+            <a:extLst>
+              <a:ext uri="{FF2B5EF4-FFF2-40B4-BE49-F238E27FC236}">
+                <a16:creationId xmlns="" xmlns:a16="http://schemas.microsoft.com/office/drawing/2014/main" id="{B58880D4-F928-4BAB-8F86-FB3A27D3AE1E}"/>
+              </a:ext>
+            </a:extLst>
+          </p:cNvPr>
+          <p:cNvSpPr>
+            <a:spLocks noGrp="1"/>
+          </p:cNvSpPr>
+          <p:nvPr>
+            <p:ph type="title"/>
+          </p:nvPr>
+        </p:nvSpPr>
+        <p:spPr/>
+        <p:txBody>
+          <a:bodyPr/>
+          <a:lstStyle/>
+          <a:p>
+            <a:r>
+              <a:rPr lang="fr-FR" dirty="0"/>
+              <a:t>Product </a:t>
+            </a:r>
+            <a:r>
+              <a:rPr lang="fr-FR" dirty="0" smtClean="0"/>
+              <a:t>Planning [3/3]</a:t>
+            </a:r>
+            <a:endParaRPr lang="en-US" dirty="0"/>
+          </a:p>
+        </p:txBody>
+      </p:sp>
+    </p:spTree>
+    <p:extLst>
+      <p:ext uri="{BB962C8B-B14F-4D97-AF65-F5344CB8AC3E}">
+        <p14:creationId xmlns:p14="http://schemas.microsoft.com/office/powerpoint/2010/main" val="525688119"/>
+      </p:ext>
+    </p:extLst>
+  </p:cSld>
+  <p:clrMapOvr>
+    <a:masterClrMapping/>
+  </p:clrMapOvr>
+</p:sld>
+</file>
+
+<file path=ppt/slides/slide15.xml><?xml version="1.0" encoding="utf-8"?>
+<p:sld xmlns:a="http://schemas.openxmlformats.org/drawingml/2006/main" xmlns:r="http://schemas.openxmlformats.org/officeDocument/2006/relationships" xmlns:p="http://schemas.openxmlformats.org/presentationml/2006/main">
+  <p:cSld>
+    <p:spTree>
+      <p:nvGrpSpPr>
+        <p:cNvPr id="1" name=""/>
+        <p:cNvGrpSpPr/>
+        <p:nvPr/>
+      </p:nvGrpSpPr>
+      <p:grpSpPr>
+        <a:xfrm>
+          <a:off x="0" y="0"/>
+          <a:ext cx="0" cy="0"/>
+          <a:chOff x="0" y="0"/>
+          <a:chExt cx="0" cy="0"/>
+        </a:xfrm>
+      </p:grpSpPr>
+      <p:sp>
+        <p:nvSpPr>
+          <p:cNvPr id="2" name="Text Placeholder 1">
+            <a:extLst>
+              <a:ext uri="{FF2B5EF4-FFF2-40B4-BE49-F238E27FC236}">
+                <a16:creationId xmlns="" xmlns:a16="http://schemas.microsoft.com/office/drawing/2014/main" id="{576D1632-C889-465C-A567-CA185B1F9244}"/>
+              </a:ext>
+            </a:extLst>
+          </p:cNvPr>
+          <p:cNvSpPr>
+            <a:spLocks noGrp="1"/>
+          </p:cNvSpPr>
+          <p:nvPr>
+            <p:ph type="body" idx="1"/>
+          </p:nvPr>
+        </p:nvSpPr>
         <p:spPr>
           <a:xfrm>
             <a:off x="457030" y="1662237"/>
@@ -7379,7 +7689,7 @@
           <p:cNvPr id="3" name="Text Placeholder 2">
             <a:extLst>
               <a:ext uri="{FF2B5EF4-FFF2-40B4-BE49-F238E27FC236}">
-                <a16:creationId xmlns:a16="http://schemas.microsoft.com/office/drawing/2014/main" xmlns="" id="{3CE1B846-8A60-40E5-B39B-A284E2BB3899}"/>
+                <a16:creationId xmlns="" xmlns:a16="http://schemas.microsoft.com/office/drawing/2014/main" id="{3CE1B846-8A60-40E5-B39B-A284E2BB3899}"/>
               </a:ext>
             </a:extLst>
           </p:cNvPr>
@@ -7427,7 +7737,7 @@
           <p:cNvPr id="4" name="Title 3">
             <a:extLst>
               <a:ext uri="{FF2B5EF4-FFF2-40B4-BE49-F238E27FC236}">
-                <a16:creationId xmlns:a16="http://schemas.microsoft.com/office/drawing/2014/main" xmlns="" id="{09ACD31A-B87D-43FD-8A7E-250C3FD8A9B0}"/>
+                <a16:creationId xmlns="" xmlns:a16="http://schemas.microsoft.com/office/drawing/2014/main" id="{09ACD31A-B87D-43FD-8A7E-250C3FD8A9B0}"/>
               </a:ext>
             </a:extLst>
           </p:cNvPr>
@@ -7486,7 +7796,7 @@
           <p:cNvPr id="2" name="Text Placeholder 1">
             <a:extLst>
               <a:ext uri="{FF2B5EF4-FFF2-40B4-BE49-F238E27FC236}">
-                <a16:creationId xmlns:a16="http://schemas.microsoft.com/office/drawing/2014/main" xmlns="" id="{57618B06-C8A8-4469-855E-61B392DFFAFC}"/>
+                <a16:creationId xmlns="" xmlns:a16="http://schemas.microsoft.com/office/drawing/2014/main" id="{57618B06-C8A8-4469-855E-61B392DFFAFC}"/>
               </a:ext>
             </a:extLst>
           </p:cNvPr>
@@ -7538,7 +7848,7 @@
           <p:cNvPr id="4" name="Title 3">
             <a:extLst>
               <a:ext uri="{FF2B5EF4-FFF2-40B4-BE49-F238E27FC236}">
-                <a16:creationId xmlns:a16="http://schemas.microsoft.com/office/drawing/2014/main" xmlns="" id="{A8E00CF9-B64D-475E-8EFD-166477C1CA41}"/>
+                <a16:creationId xmlns="" xmlns:a16="http://schemas.microsoft.com/office/drawing/2014/main" id="{A8E00CF9-B64D-475E-8EFD-166477C1CA41}"/>
               </a:ext>
             </a:extLst>
           </p:cNvPr>
@@ -7605,7 +7915,7 @@
           <p:cNvPr id="2" name="Text Placeholder 1">
             <a:extLst>
               <a:ext uri="{FF2B5EF4-FFF2-40B4-BE49-F238E27FC236}">
-                <a16:creationId xmlns:a16="http://schemas.microsoft.com/office/drawing/2014/main" xmlns="" id="{826A09AA-0F31-4462-9395-565580C8D524}"/>
+                <a16:creationId xmlns="" xmlns:a16="http://schemas.microsoft.com/office/drawing/2014/main" id="{826A09AA-0F31-4462-9395-565580C8D524}"/>
               </a:ext>
             </a:extLst>
           </p:cNvPr>
@@ -7616,7 +7926,12 @@
             <p:ph type="body" idx="1"/>
           </p:nvPr>
         </p:nvSpPr>
-        <p:spPr/>
+        <p:spPr>
+          <a:xfrm>
+            <a:off x="276012" y="3356992"/>
+            <a:ext cx="10869084" cy="4226428"/>
+          </a:xfrm>
+        </p:spPr>
         <p:txBody>
           <a:bodyPr/>
           <a:lstStyle/>
@@ -7645,7 +7960,7 @@
           <p:cNvPr id="3" name="Text Placeholder 2">
             <a:extLst>
               <a:ext uri="{FF2B5EF4-FFF2-40B4-BE49-F238E27FC236}">
-                <a16:creationId xmlns:a16="http://schemas.microsoft.com/office/drawing/2014/main" xmlns="" id="{5DCD3969-F3F4-474C-BFD9-B9942D360873}"/>
+                <a16:creationId xmlns="" xmlns:a16="http://schemas.microsoft.com/office/drawing/2014/main" id="{5DCD3969-F3F4-474C-BFD9-B9942D360873}"/>
               </a:ext>
             </a:extLst>
           </p:cNvPr>
@@ -7661,18 +7976,6 @@
           <a:bodyPr/>
           <a:lstStyle/>
           <a:p>
-            <a:r>
-              <a:rPr lang="fr-FR" dirty="0" smtClean="0"/>
-              <a:t>&lt;</a:t>
-            </a:r>
-            <a:r>
-              <a:rPr lang="fr-FR" dirty="0" err="1" smtClean="0"/>
-              <a:t>poTech</a:t>
-            </a:r>
-            <a:r>
-              <a:rPr lang="fr-FR" dirty="0" smtClean="0"/>
-              <a:t>&gt;</a:t>
-            </a:r>
             <a:endParaRPr lang="en-US" dirty="0"/>
           </a:p>
         </p:txBody>
@@ -7682,7 +7985,7 @@
           <p:cNvPr id="4" name="Title 3">
             <a:extLst>
               <a:ext uri="{FF2B5EF4-FFF2-40B4-BE49-F238E27FC236}">
-                <a16:creationId xmlns:a16="http://schemas.microsoft.com/office/drawing/2014/main" xmlns="" id="{83DD17B1-6CB7-4354-8701-009D08BAB665}"/>
+                <a16:creationId xmlns="" xmlns:a16="http://schemas.microsoft.com/office/drawing/2014/main" id="{83DD17B1-6CB7-4354-8701-009D08BAB665}"/>
               </a:ext>
             </a:extLst>
           </p:cNvPr>
@@ -7700,12 +8003,40 @@
           <a:p>
             <a:r>
               <a:rPr lang="fr-FR" dirty="0"/>
-              <a:t>Project Introduction</a:t>
+              <a:t>Project </a:t>
+            </a:r>
+            <a:r>
+              <a:rPr lang="fr-FR" dirty="0" smtClean="0"/>
+              <a:t>Introduction [1/2]</a:t>
             </a:r>
             <a:endParaRPr lang="en-US" dirty="0"/>
           </a:p>
         </p:txBody>
       </p:sp>
+      <p:pic>
+        <p:nvPicPr>
+          <p:cNvPr id="5" name="Image 4"/>
+          <p:cNvPicPr>
+            <a:picLocks noChangeAspect="1"/>
+          </p:cNvPicPr>
+          <p:nvPr/>
+        </p:nvPicPr>
+        <p:blipFill>
+          <a:blip r:embed="rId2"/>
+          <a:stretch>
+            <a:fillRect/>
+          </a:stretch>
+        </p:blipFill>
+        <p:spPr>
+          <a:xfrm>
+            <a:off x="3647728" y="980728"/>
+            <a:ext cx="4125652" cy="2542433"/>
+          </a:xfrm>
+          <a:prstGeom prst="rect">
+            <a:avLst/>
+          </a:prstGeom>
+        </p:spPr>
+      </p:pic>
     </p:spTree>
     <p:extLst>
       <p:ext uri="{BB962C8B-B14F-4D97-AF65-F5344CB8AC3E}">
@@ -7738,53 +8069,10 @@
       </p:grpSpPr>
       <p:sp>
         <p:nvSpPr>
-          <p:cNvPr id="2" name="Text Placeholder 1">
-            <a:extLst>
-              <a:ext uri="{FF2B5EF4-FFF2-40B4-BE49-F238E27FC236}">
-                <a16:creationId xmlns:a16="http://schemas.microsoft.com/office/drawing/2014/main" xmlns="" id="{6A753048-6BD6-4745-A479-DBAD34CB3216}"/>
-              </a:ext>
-            </a:extLst>
-          </p:cNvPr>
-          <p:cNvSpPr>
-            <a:spLocks noGrp="1"/>
-          </p:cNvSpPr>
-          <p:nvPr>
-            <p:ph type="body" idx="1"/>
-          </p:nvPr>
-        </p:nvSpPr>
-        <p:spPr/>
-        <p:txBody>
-          <a:bodyPr/>
-          <a:lstStyle/>
-          <a:p>
-            <a:r>
-              <a:rPr lang="fr-FR" dirty="0"/>
-              <a:t>Rodrigo, cadre dans une entreprise du numérique, aime peaufiner la décoration de son appartement. Particulièrement adepte du “green house” il possède de nombreuses plantes.</a:t>
-            </a:r>
-          </a:p>
-          <a:p>
-            <a:r>
-              <a:rPr lang="fr-FR" dirty="0"/>
-              <a:t>Cependant ses horaires sont assez larges, 9h/18h en général et différents déplacements mensuels. Il ne peut donc pas arroser efficacement ses plantes tout au long de la journée, ni leur faire profiter d’un ensoleillement optimal.</a:t>
-            </a:r>
-          </a:p>
-          <a:p>
-            <a:endParaRPr lang="fr-FR" dirty="0"/>
-          </a:p>
-          <a:p>
-            <a:r>
-              <a:rPr lang="fr-FR" dirty="0"/>
-              <a:t>Grâce à notre produit il pourra paramétrer au besoin les différents pots, et les contrôler à distance si nécessaire.</a:t>
-            </a:r>
-          </a:p>
-        </p:txBody>
-      </p:sp>
-      <p:sp>
-        <p:nvSpPr>
           <p:cNvPr id="3" name="Text Placeholder 2">
             <a:extLst>
               <a:ext uri="{FF2B5EF4-FFF2-40B4-BE49-F238E27FC236}">
-                <a16:creationId xmlns:a16="http://schemas.microsoft.com/office/drawing/2014/main" xmlns="" id="{B5A8B3F6-F49D-4359-9E12-3F0C089B2E23}"/>
+                <a16:creationId xmlns="" xmlns:a16="http://schemas.microsoft.com/office/drawing/2014/main" id="{5DCD3969-F3F4-474C-BFD9-B9942D360873}"/>
               </a:ext>
             </a:extLst>
           </p:cNvPr>
@@ -7821,7 +8109,7 @@
           <p:cNvPr id="4" name="Title 3">
             <a:extLst>
               <a:ext uri="{FF2B5EF4-FFF2-40B4-BE49-F238E27FC236}">
-                <a16:creationId xmlns:a16="http://schemas.microsoft.com/office/drawing/2014/main" xmlns="" id="{9E541666-6E26-4F40-A926-D9E557AF3D4F}"/>
+                <a16:creationId xmlns="" xmlns:a16="http://schemas.microsoft.com/office/drawing/2014/main" id="{83DD17B1-6CB7-4354-8701-009D08BAB665}"/>
               </a:ext>
             </a:extLst>
           </p:cNvPr>
@@ -7839,20 +8127,61 @@
           <a:p>
             <a:r>
               <a:rPr lang="fr-FR" dirty="0"/>
-              <a:t>Project Use cases [</a:t>
+              <a:t>Project </a:t>
             </a:r>
             <a:r>
               <a:rPr lang="fr-FR" dirty="0" smtClean="0"/>
-              <a:t>1/2]</a:t>
+              <a:t>Introduction [2/2]</a:t>
             </a:r>
             <a:endParaRPr lang="en-US" dirty="0"/>
           </a:p>
         </p:txBody>
       </p:sp>
+      <p:pic>
+        <p:nvPicPr>
+          <p:cNvPr id="1026" name="Picture 2" descr="https://cdn.discordapp.com/attachments/555745296341270529/568742703744024588/Presentation.004.jpeg"/>
+          <p:cNvPicPr>
+            <a:picLocks noChangeAspect="1" noChangeArrowheads="1"/>
+          </p:cNvPicPr>
+          <p:nvPr/>
+        </p:nvPicPr>
+        <p:blipFill>
+          <a:blip r:embed="rId2">
+            <a:extLst>
+              <a:ext uri="{28A0092B-C50C-407E-A947-70E740481C1C}">
+                <a14:useLocalDpi xmlns:a14="http://schemas.microsoft.com/office/drawing/2010/main" val="0"/>
+              </a:ext>
+            </a:extLst>
+          </a:blip>
+          <a:srcRect/>
+          <a:stretch>
+            <a:fillRect/>
+          </a:stretch>
+        </p:blipFill>
+        <p:spPr bwMode="auto">
+          <a:xfrm>
+            <a:off x="2711624" y="1511498"/>
+            <a:ext cx="6696744" cy="5022558"/>
+          </a:xfrm>
+          <a:prstGeom prst="rect">
+            <a:avLst/>
+          </a:prstGeom>
+          <a:noFill/>
+          <a:extLst>
+            <a:ext uri="{909E8E84-426E-40DD-AFC4-6F175D3DCCD1}">
+              <a14:hiddenFill xmlns:a14="http://schemas.microsoft.com/office/drawing/2010/main">
+                <a:solidFill>
+                  <a:srgbClr val="FFFFFF"/>
+                </a:solidFill>
+              </a14:hiddenFill>
+            </a:ext>
+          </a:extLst>
+        </p:spPr>
+      </p:pic>
     </p:spTree>
     <p:extLst>
       <p:ext uri="{BB962C8B-B14F-4D97-AF65-F5344CB8AC3E}">
-        <p14:creationId xmlns:p14="http://schemas.microsoft.com/office/powerpoint/2010/main" val="1546075155"/>
+        <p14:creationId xmlns:p14="http://schemas.microsoft.com/office/powerpoint/2010/main" val="1801365197"/>
       </p:ext>
     </p:extLst>
   </p:cSld>
@@ -7884,7 +8213,7 @@
           <p:cNvPr id="2" name="Text Placeholder 1">
             <a:extLst>
               <a:ext uri="{FF2B5EF4-FFF2-40B4-BE49-F238E27FC236}">
-                <a16:creationId xmlns:a16="http://schemas.microsoft.com/office/drawing/2014/main" xmlns="" id="{6A753048-6BD6-4745-A479-DBAD34CB3216}"/>
+                <a16:creationId xmlns="" xmlns:a16="http://schemas.microsoft.com/office/drawing/2014/main" id="{6A753048-6BD6-4745-A479-DBAD34CB3216}"/>
               </a:ext>
             </a:extLst>
           </p:cNvPr>
@@ -7901,12 +8230,14 @@
           <a:lstStyle/>
           <a:p>
             <a:r>
-              <a:rPr lang="fr-FR" dirty="0" err="1"/>
-              <a:t>Jeane</a:t>
-            </a:r>
-            <a:r>
               <a:rPr lang="fr-FR" dirty="0"/>
-              <a:t>, fan de voyages et de week-end de trois jours, possède différentes plantes chez-elle. </a:t>
+              <a:t>Rodrigo, cadre dans une entreprise du numérique, aime peaufiner la décoration de son appartement. Particulièrement adepte du “green house” il possède de nombreuses plantes.</a:t>
+            </a:r>
+          </a:p>
+          <a:p>
+            <a:r>
+              <a:rPr lang="fr-FR" dirty="0"/>
+              <a:t>Cependant ses horaires sont assez larges, 9h/18h en général et différents déplacements mensuels. Il ne peut donc pas arroser efficacement ses plantes tout au long de la journée, ni leur faire profiter d’un ensoleillement optimal.</a:t>
             </a:r>
           </a:p>
           <a:p>
@@ -7915,20 +8246,8 @@
           <a:p>
             <a:r>
               <a:rPr lang="fr-FR" dirty="0"/>
-              <a:t>A chaque week-end de trois jours (merci le lundi de Paques !) c’est pareil, ses plantations sont méconnaissables à son retour.</a:t>
-            </a:r>
-          </a:p>
-          <a:p>
-            <a:endParaRPr lang="fr-FR" dirty="0"/>
-          </a:p>
-          <a:p>
-            <a:r>
-              <a:rPr lang="fr-FR" dirty="0"/>
-              <a:t>Grâce à notre produit elle pourra partir l’esprit tranquille, tout se gérera automatiquement. Et elle pourra consulter en temps réel le bon fonctionnement du matériel grâce aux données de l’appli.</a:t>
-            </a:r>
-          </a:p>
-          <a:p>
-            <a:endParaRPr lang="fr-FR" dirty="0" err="1"/>
+              <a:t>Grâce à notre produit il pourra paramétrer au besoin les différents pots, et les contrôler à distance si nécessaire.</a:t>
+            </a:r>
           </a:p>
         </p:txBody>
       </p:sp>
@@ -7937,7 +8256,7 @@
           <p:cNvPr id="3" name="Text Placeholder 2">
             <a:extLst>
               <a:ext uri="{FF2B5EF4-FFF2-40B4-BE49-F238E27FC236}">
-                <a16:creationId xmlns:a16="http://schemas.microsoft.com/office/drawing/2014/main" xmlns="" id="{B5A8B3F6-F49D-4359-9E12-3F0C089B2E23}"/>
+                <a16:creationId xmlns="" xmlns:a16="http://schemas.microsoft.com/office/drawing/2014/main" id="{B5A8B3F6-F49D-4359-9E12-3F0C089B2E23}"/>
               </a:ext>
             </a:extLst>
           </p:cNvPr>
@@ -7974,7 +8293,7 @@
           <p:cNvPr id="4" name="Title 3">
             <a:extLst>
               <a:ext uri="{FF2B5EF4-FFF2-40B4-BE49-F238E27FC236}">
-                <a16:creationId xmlns:a16="http://schemas.microsoft.com/office/drawing/2014/main" xmlns="" id="{9E541666-6E26-4F40-A926-D9E557AF3D4F}"/>
+                <a16:creationId xmlns="" xmlns:a16="http://schemas.microsoft.com/office/drawing/2014/main" id="{9E541666-6E26-4F40-A926-D9E557AF3D4F}"/>
               </a:ext>
             </a:extLst>
           </p:cNvPr>
@@ -7992,11 +8311,11 @@
           <a:p>
             <a:r>
               <a:rPr lang="fr-FR" dirty="0"/>
-              <a:t>Project Use cases </a:t>
+              <a:t>Project Use cases [</a:t>
             </a:r>
             <a:r>
               <a:rPr lang="fr-FR" dirty="0" smtClean="0"/>
-              <a:t>[2/2]</a:t>
+              <a:t>1/2]</a:t>
             </a:r>
             <a:endParaRPr lang="en-US" dirty="0"/>
           </a:p>
@@ -8005,7 +8324,7 @@
     </p:spTree>
     <p:extLst>
       <p:ext uri="{BB962C8B-B14F-4D97-AF65-F5344CB8AC3E}">
-        <p14:creationId xmlns:p14="http://schemas.microsoft.com/office/powerpoint/2010/main" val="3594963567"/>
+        <p14:creationId xmlns:p14="http://schemas.microsoft.com/office/powerpoint/2010/main" val="1546075155"/>
       </p:ext>
     </p:extLst>
   </p:cSld>
@@ -8037,7 +8356,7 @@
           <p:cNvPr id="2" name="Text Placeholder 1">
             <a:extLst>
               <a:ext uri="{FF2B5EF4-FFF2-40B4-BE49-F238E27FC236}">
-                <a16:creationId xmlns:a16="http://schemas.microsoft.com/office/drawing/2014/main" xmlns="" id="{B6F8AC67-6D9C-47B0-9C78-55034137C6E3}"/>
+                <a16:creationId xmlns="" xmlns:a16="http://schemas.microsoft.com/office/drawing/2014/main" id="{6A753048-6BD6-4745-A479-DBAD34CB3216}"/>
               </a:ext>
             </a:extLst>
           </p:cNvPr>
@@ -8053,13 +8372,35 @@
           <a:bodyPr/>
           <a:lstStyle/>
           <a:p>
-            <a:endParaRPr lang="en-US" dirty="0" smtClean="0"/>
-          </a:p>
-          <a:p>
-            <a:endParaRPr lang="en-US" dirty="0"/>
-          </a:p>
-          <a:p>
-            <a:endParaRPr lang="en-US" dirty="0"/>
+            <a:r>
+              <a:rPr lang="fr-FR" dirty="0" err="1"/>
+              <a:t>Jeane</a:t>
+            </a:r>
+            <a:r>
+              <a:rPr lang="fr-FR" dirty="0"/>
+              <a:t>, fan de voyages et de week-end de trois jours, possède différentes plantes chez-elle. </a:t>
+            </a:r>
+          </a:p>
+          <a:p>
+            <a:endParaRPr lang="fr-FR" dirty="0"/>
+          </a:p>
+          <a:p>
+            <a:r>
+              <a:rPr lang="fr-FR" dirty="0"/>
+              <a:t>A chaque week-end de trois jours (merci le lundi de Paques !) c’est pareil, ses plantations sont méconnaissables à son retour.</a:t>
+            </a:r>
+          </a:p>
+          <a:p>
+            <a:endParaRPr lang="fr-FR" dirty="0"/>
+          </a:p>
+          <a:p>
+            <a:r>
+              <a:rPr lang="fr-FR" dirty="0"/>
+              <a:t>Grâce à notre produit elle pourra partir l’esprit tranquille, tout se gérera automatiquement. Et elle pourra consulter en temps réel le bon fonctionnement du matériel grâce aux données de l’appli.</a:t>
+            </a:r>
+          </a:p>
+          <a:p>
+            <a:endParaRPr lang="fr-FR" dirty="0" err="1"/>
           </a:p>
         </p:txBody>
       </p:sp>
@@ -8068,7 +8409,7 @@
           <p:cNvPr id="3" name="Text Placeholder 2">
             <a:extLst>
               <a:ext uri="{FF2B5EF4-FFF2-40B4-BE49-F238E27FC236}">
-                <a16:creationId xmlns:a16="http://schemas.microsoft.com/office/drawing/2014/main" xmlns="" id="{597D0BC2-3189-4626-BEAD-D450511C8E15}"/>
+                <a16:creationId xmlns="" xmlns:a16="http://schemas.microsoft.com/office/drawing/2014/main" id="{B5A8B3F6-F49D-4359-9E12-3F0C089B2E23}"/>
               </a:ext>
             </a:extLst>
           </p:cNvPr>
@@ -8105,7 +8446,138 @@
           <p:cNvPr id="4" name="Title 3">
             <a:extLst>
               <a:ext uri="{FF2B5EF4-FFF2-40B4-BE49-F238E27FC236}">
-                <a16:creationId xmlns:a16="http://schemas.microsoft.com/office/drawing/2014/main" xmlns="" id="{814F351C-F6DB-43DC-AD1C-1759C3C5EC88}"/>
+                <a16:creationId xmlns="" xmlns:a16="http://schemas.microsoft.com/office/drawing/2014/main" id="{9E541666-6E26-4F40-A926-D9E557AF3D4F}"/>
+              </a:ext>
+            </a:extLst>
+          </p:cNvPr>
+          <p:cNvSpPr>
+            <a:spLocks noGrp="1"/>
+          </p:cNvSpPr>
+          <p:nvPr>
+            <p:ph type="title"/>
+          </p:nvPr>
+        </p:nvSpPr>
+        <p:spPr/>
+        <p:txBody>
+          <a:bodyPr/>
+          <a:lstStyle/>
+          <a:p>
+            <a:r>
+              <a:rPr lang="fr-FR" dirty="0"/>
+              <a:t>Project Use cases </a:t>
+            </a:r>
+            <a:r>
+              <a:rPr lang="fr-FR" dirty="0" smtClean="0"/>
+              <a:t>[2/2]</a:t>
+            </a:r>
+            <a:endParaRPr lang="en-US" dirty="0"/>
+          </a:p>
+        </p:txBody>
+      </p:sp>
+    </p:spTree>
+    <p:extLst>
+      <p:ext uri="{BB962C8B-B14F-4D97-AF65-F5344CB8AC3E}">
+        <p14:creationId xmlns:p14="http://schemas.microsoft.com/office/powerpoint/2010/main" val="3594963567"/>
+      </p:ext>
+    </p:extLst>
+  </p:cSld>
+  <p:clrMapOvr>
+    <a:masterClrMapping/>
+  </p:clrMapOvr>
+</p:sld>
+</file>
+
+<file path=ppt/slides/slide7.xml><?xml version="1.0" encoding="utf-8"?>
+<p:sld xmlns:a="http://schemas.openxmlformats.org/drawingml/2006/main" xmlns:r="http://schemas.openxmlformats.org/officeDocument/2006/relationships" xmlns:p="http://schemas.openxmlformats.org/presentationml/2006/main">
+  <p:cSld>
+    <p:spTree>
+      <p:nvGrpSpPr>
+        <p:cNvPr id="1" name=""/>
+        <p:cNvGrpSpPr/>
+        <p:nvPr/>
+      </p:nvGrpSpPr>
+      <p:grpSpPr>
+        <a:xfrm>
+          <a:off x="0" y="0"/>
+          <a:ext cx="0" cy="0"/>
+          <a:chOff x="0" y="0"/>
+          <a:chExt cx="0" cy="0"/>
+        </a:xfrm>
+      </p:grpSpPr>
+      <p:sp>
+        <p:nvSpPr>
+          <p:cNvPr id="2" name="Text Placeholder 1">
+            <a:extLst>
+              <a:ext uri="{FF2B5EF4-FFF2-40B4-BE49-F238E27FC236}">
+                <a16:creationId xmlns="" xmlns:a16="http://schemas.microsoft.com/office/drawing/2014/main" id="{B6F8AC67-6D9C-47B0-9C78-55034137C6E3}"/>
+              </a:ext>
+            </a:extLst>
+          </p:cNvPr>
+          <p:cNvSpPr>
+            <a:spLocks noGrp="1"/>
+          </p:cNvSpPr>
+          <p:nvPr>
+            <p:ph type="body" idx="1"/>
+          </p:nvPr>
+        </p:nvSpPr>
+        <p:spPr/>
+        <p:txBody>
+          <a:bodyPr/>
+          <a:lstStyle/>
+          <a:p>
+            <a:endParaRPr lang="en-US" dirty="0" smtClean="0"/>
+          </a:p>
+          <a:p>
+            <a:endParaRPr lang="en-US" dirty="0"/>
+          </a:p>
+          <a:p>
+            <a:endParaRPr lang="en-US" dirty="0"/>
+          </a:p>
+        </p:txBody>
+      </p:sp>
+      <p:sp>
+        <p:nvSpPr>
+          <p:cNvPr id="3" name="Text Placeholder 2">
+            <a:extLst>
+              <a:ext uri="{FF2B5EF4-FFF2-40B4-BE49-F238E27FC236}">
+                <a16:creationId xmlns="" xmlns:a16="http://schemas.microsoft.com/office/drawing/2014/main" id="{597D0BC2-3189-4626-BEAD-D450511C8E15}"/>
+              </a:ext>
+            </a:extLst>
+          </p:cNvPr>
+          <p:cNvSpPr>
+            <a:spLocks noGrp="1"/>
+          </p:cNvSpPr>
+          <p:nvPr>
+            <p:ph type="body" sz="quarter" idx="12"/>
+          </p:nvPr>
+        </p:nvSpPr>
+        <p:spPr/>
+        <p:txBody>
+          <a:bodyPr/>
+          <a:lstStyle/>
+          <a:p>
+            <a:r>
+              <a:rPr lang="fr-FR" dirty="0" smtClean="0"/>
+              <a:t>&lt;</a:t>
+            </a:r>
+            <a:r>
+              <a:rPr lang="fr-FR" dirty="0" err="1" smtClean="0"/>
+              <a:t>poTech</a:t>
+            </a:r>
+            <a:r>
+              <a:rPr lang="fr-FR" dirty="0" smtClean="0"/>
+              <a:t>&gt;</a:t>
+            </a:r>
+            <a:endParaRPr lang="en-US" dirty="0"/>
+          </a:p>
+        </p:txBody>
+      </p:sp>
+      <p:sp>
+        <p:nvSpPr>
+          <p:cNvPr id="4" name="Title 3">
+            <a:extLst>
+              <a:ext uri="{FF2B5EF4-FFF2-40B4-BE49-F238E27FC236}">
+                <a16:creationId xmlns="" xmlns:a16="http://schemas.microsoft.com/office/drawing/2014/main" id="{814F351C-F6DB-43DC-AD1C-1759C3C5EC88}"/>
               </a:ext>
             </a:extLst>
           </p:cNvPr>
@@ -8187,7 +8659,7 @@
 </p:sld>
 </file>
 
-<file path=ppt/slides/slide7.xml><?xml version="1.0" encoding="utf-8"?>
+<file path=ppt/slides/slide8.xml><?xml version="1.0" encoding="utf-8"?>
 <p:sld xmlns:a="http://schemas.openxmlformats.org/drawingml/2006/main" xmlns:r="http://schemas.openxmlformats.org/officeDocument/2006/relationships" xmlns:p="http://schemas.openxmlformats.org/presentationml/2006/main">
   <p:cSld>
     <p:spTree>
@@ -8209,7 +8681,7 @@
           <p:cNvPr id="2" name="Text Placeholder 1">
             <a:extLst>
               <a:ext uri="{FF2B5EF4-FFF2-40B4-BE49-F238E27FC236}">
-                <a16:creationId xmlns:a16="http://schemas.microsoft.com/office/drawing/2014/main" xmlns="" id="{B6F8AC67-6D9C-47B0-9C78-55034137C6E3}"/>
+                <a16:creationId xmlns="" xmlns:a16="http://schemas.microsoft.com/office/drawing/2014/main" id="{B6F8AC67-6D9C-47B0-9C78-55034137C6E3}"/>
               </a:ext>
             </a:extLst>
           </p:cNvPr>
@@ -8240,7 +8712,7 @@
           <p:cNvPr id="3" name="Text Placeholder 2">
             <a:extLst>
               <a:ext uri="{FF2B5EF4-FFF2-40B4-BE49-F238E27FC236}">
-                <a16:creationId xmlns:a16="http://schemas.microsoft.com/office/drawing/2014/main" xmlns="" id="{597D0BC2-3189-4626-BEAD-D450511C8E15}"/>
+                <a16:creationId xmlns="" xmlns:a16="http://schemas.microsoft.com/office/drawing/2014/main" id="{597D0BC2-3189-4626-BEAD-D450511C8E15}"/>
               </a:ext>
             </a:extLst>
           </p:cNvPr>
@@ -8277,7 +8749,7 @@
           <p:cNvPr id="4" name="Title 3">
             <a:extLst>
               <a:ext uri="{FF2B5EF4-FFF2-40B4-BE49-F238E27FC236}">
-                <a16:creationId xmlns:a16="http://schemas.microsoft.com/office/drawing/2014/main" xmlns="" id="{814F351C-F6DB-43DC-AD1C-1759C3C5EC88}"/>
+                <a16:creationId xmlns="" xmlns:a16="http://schemas.microsoft.com/office/drawing/2014/main" id="{814F351C-F6DB-43DC-AD1C-1759C3C5EC88}"/>
               </a:ext>
             </a:extLst>
           </p:cNvPr>
@@ -8310,7 +8782,7 @@
           <p:cNvPr id="6" name="Text Placeholder 1">
             <a:extLst>
               <a:ext uri="{FF2B5EF4-FFF2-40B4-BE49-F238E27FC236}">
-                <a16:creationId xmlns:a16="http://schemas.microsoft.com/office/drawing/2014/main" xmlns="" id="{53DBDAB2-BE11-4B9D-85BC-5DE3D2A0A607}"/>
+                <a16:creationId xmlns="" xmlns:a16="http://schemas.microsoft.com/office/drawing/2014/main" id="{53DBDAB2-BE11-4B9D-85BC-5DE3D2A0A607}"/>
               </a:ext>
             </a:extLst>
           </p:cNvPr>
@@ -8619,164 +9091,6 @@
 </p:sld>
 </file>
 
-<file path=ppt/slides/slide8.xml><?xml version="1.0" encoding="utf-8"?>
-<p:sld xmlns:a="http://schemas.openxmlformats.org/drawingml/2006/main" xmlns:r="http://schemas.openxmlformats.org/officeDocument/2006/relationships" xmlns:p="http://schemas.openxmlformats.org/presentationml/2006/main">
-  <p:cSld>
-    <p:spTree>
-      <p:nvGrpSpPr>
-        <p:cNvPr id="1" name=""/>
-        <p:cNvGrpSpPr/>
-        <p:nvPr/>
-      </p:nvGrpSpPr>
-      <p:grpSpPr>
-        <a:xfrm>
-          <a:off x="0" y="0"/>
-          <a:ext cx="0" cy="0"/>
-          <a:chOff x="0" y="0"/>
-          <a:chExt cx="0" cy="0"/>
-        </a:xfrm>
-      </p:grpSpPr>
-      <p:sp>
-        <p:nvSpPr>
-          <p:cNvPr id="2" name="Text Placeholder 1">
-            <a:extLst>
-              <a:ext uri="{FF2B5EF4-FFF2-40B4-BE49-F238E27FC236}">
-                <a16:creationId xmlns:a16="http://schemas.microsoft.com/office/drawing/2014/main" xmlns="" id="{53DBDAB2-BE11-4B9D-85BC-5DE3D2A0A607}"/>
-              </a:ext>
-            </a:extLst>
-          </p:cNvPr>
-          <p:cNvSpPr>
-            <a:spLocks noGrp="1"/>
-          </p:cNvSpPr>
-          <p:nvPr>
-            <p:ph type="body" idx="1"/>
-          </p:nvPr>
-        </p:nvSpPr>
-        <p:spPr>
-          <a:xfrm>
-            <a:off x="447975" y="1929798"/>
-            <a:ext cx="10869084" cy="4226428"/>
-          </a:xfrm>
-        </p:spPr>
-        <p:txBody>
-          <a:bodyPr/>
-          <a:lstStyle/>
-          <a:p>
-            <a:r>
-              <a:rPr lang="fr-FR" dirty="0"/>
-              <a:t>Nous détaillons ici que les grandes taches, à découper ensuite en plus petites fonctionnalités pour mieux se les répartir,</a:t>
-            </a:r>
-          </a:p>
-          <a:p>
-            <a:endParaRPr lang="fr-FR" dirty="0"/>
-          </a:p>
-          <a:p>
-            <a:r>
-              <a:rPr lang="fr-FR" dirty="0"/>
-              <a:t>Tâche 1 : Paramétrage de la Gateway et du robot, c’est à dire mettre en place tout l’environnement réseau pour que la </a:t>
-            </a:r>
-            <a:r>
-              <a:rPr lang="fr-FR" dirty="0" err="1"/>
-              <a:t>gateway</a:t>
-            </a:r>
-            <a:r>
-              <a:rPr lang="fr-FR" dirty="0"/>
-              <a:t> et le robot soient connectés, et que les informations transitent bien dans les deux sens sans problème.</a:t>
-            </a:r>
-          </a:p>
-        </p:txBody>
-      </p:sp>
-      <p:sp>
-        <p:nvSpPr>
-          <p:cNvPr id="3" name="Text Placeholder 2">
-            <a:extLst>
-              <a:ext uri="{FF2B5EF4-FFF2-40B4-BE49-F238E27FC236}">
-                <a16:creationId xmlns:a16="http://schemas.microsoft.com/office/drawing/2014/main" xmlns="" id="{EBDB337E-4389-4B90-8B96-853A42017204}"/>
-              </a:ext>
-            </a:extLst>
-          </p:cNvPr>
-          <p:cNvSpPr>
-            <a:spLocks noGrp="1"/>
-          </p:cNvSpPr>
-          <p:nvPr>
-            <p:ph type="body" sz="quarter" idx="12"/>
-          </p:nvPr>
-        </p:nvSpPr>
-        <p:spPr/>
-        <p:txBody>
-          <a:bodyPr/>
-          <a:lstStyle/>
-          <a:p>
-            <a:r>
-              <a:rPr lang="fr-FR" dirty="0" smtClean="0"/>
-              <a:t>&lt;</a:t>
-            </a:r>
-            <a:r>
-              <a:rPr lang="fr-FR" dirty="0" err="1" smtClean="0"/>
-              <a:t>poTech</a:t>
-            </a:r>
-            <a:r>
-              <a:rPr lang="fr-FR" dirty="0" smtClean="0"/>
-              <a:t>&gt;</a:t>
-            </a:r>
-            <a:endParaRPr lang="en-US" dirty="0"/>
-          </a:p>
-        </p:txBody>
-      </p:sp>
-      <p:sp>
-        <p:nvSpPr>
-          <p:cNvPr id="4" name="Title 3">
-            <a:extLst>
-              <a:ext uri="{FF2B5EF4-FFF2-40B4-BE49-F238E27FC236}">
-                <a16:creationId xmlns:a16="http://schemas.microsoft.com/office/drawing/2014/main" xmlns="" id="{F9ED67B2-9414-4565-B91A-5A6339FF2E1B}"/>
-              </a:ext>
-            </a:extLst>
-          </p:cNvPr>
-          <p:cNvSpPr>
-            <a:spLocks noGrp="1"/>
-          </p:cNvSpPr>
-          <p:nvPr>
-            <p:ph type="title"/>
-          </p:nvPr>
-        </p:nvSpPr>
-        <p:spPr/>
-        <p:txBody>
-          <a:bodyPr/>
-          <a:lstStyle/>
-          <a:p>
-            <a:r>
-              <a:rPr lang="fr-FR" dirty="0"/>
-              <a:t>Project </a:t>
-            </a:r>
-            <a:r>
-              <a:rPr lang="fr-FR" dirty="0" err="1"/>
-              <a:t>Tasks</a:t>
-            </a:r>
-            <a:r>
-              <a:rPr lang="fr-FR" dirty="0"/>
-              <a:t> [</a:t>
-            </a:r>
-            <a:r>
-              <a:rPr lang="fr-FR" dirty="0" smtClean="0"/>
-              <a:t>1/3]</a:t>
-            </a:r>
-            <a:endParaRPr lang="en-US" dirty="0"/>
-          </a:p>
-        </p:txBody>
-      </p:sp>
-    </p:spTree>
-    <p:extLst>
-      <p:ext uri="{BB962C8B-B14F-4D97-AF65-F5344CB8AC3E}">
-        <p14:creationId xmlns:p14="http://schemas.microsoft.com/office/powerpoint/2010/main" val="1969407979"/>
-      </p:ext>
-    </p:extLst>
-  </p:cSld>
-  <p:clrMapOvr>
-    <a:masterClrMapping/>
-  </p:clrMapOvr>
-</p:sld>
-</file>
-
 <file path=ppt/slides/slide9.xml><?xml version="1.0" encoding="utf-8"?>
 <p:sld xmlns:a="http://schemas.openxmlformats.org/drawingml/2006/main" xmlns:r="http://schemas.openxmlformats.org/officeDocument/2006/relationships" xmlns:p="http://schemas.openxmlformats.org/presentationml/2006/main">
   <p:cSld>
@@ -8799,7 +9113,7 @@
           <p:cNvPr id="2" name="Text Placeholder 1">
             <a:extLst>
               <a:ext uri="{FF2B5EF4-FFF2-40B4-BE49-F238E27FC236}">
-                <a16:creationId xmlns:a16="http://schemas.microsoft.com/office/drawing/2014/main" xmlns="" id="{53DBDAB2-BE11-4B9D-85BC-5DE3D2A0A607}"/>
+                <a16:creationId xmlns="" xmlns:a16="http://schemas.microsoft.com/office/drawing/2014/main" id="{53DBDAB2-BE11-4B9D-85BC-5DE3D2A0A607}"/>
               </a:ext>
             </a:extLst>
           </p:cNvPr>
@@ -8810,186 +9124,36 @@
             <p:ph type="body" idx="1"/>
           </p:nvPr>
         </p:nvSpPr>
-        <p:spPr/>
+        <p:spPr>
+          <a:xfrm>
+            <a:off x="447975" y="1929798"/>
+            <a:ext cx="10869084" cy="4226428"/>
+          </a:xfrm>
+        </p:spPr>
         <p:txBody>
           <a:bodyPr/>
           <a:lstStyle/>
           <a:p>
             <a:r>
-              <a:rPr lang="en-US" dirty="0" err="1" smtClean="0"/>
-              <a:t>Tâche</a:t>
-            </a:r>
-            <a:r>
-              <a:rPr lang="en-US" dirty="0" smtClean="0"/>
-              <a:t> 2 : </a:t>
-            </a:r>
-            <a:r>
-              <a:rPr lang="en-US" dirty="0" err="1" smtClean="0"/>
-              <a:t>Mise</a:t>
-            </a:r>
-            <a:r>
-              <a:rPr lang="en-US" dirty="0" smtClean="0"/>
-              <a:t> </a:t>
-            </a:r>
-            <a:r>
-              <a:rPr lang="en-US" dirty="0" err="1" smtClean="0"/>
-              <a:t>en</a:t>
-            </a:r>
-            <a:r>
-              <a:rPr lang="en-US" dirty="0" smtClean="0"/>
-              <a:t> place des </a:t>
-            </a:r>
-            <a:r>
-              <a:rPr lang="en-US" dirty="0" err="1" smtClean="0"/>
-              <a:t>accès</a:t>
-            </a:r>
-            <a:r>
-              <a:rPr lang="en-US" dirty="0" smtClean="0"/>
-              <a:t> à distance aux </a:t>
-            </a:r>
-            <a:r>
-              <a:rPr lang="en-US" dirty="0" err="1" smtClean="0"/>
-              <a:t>données</a:t>
-            </a:r>
-            <a:r>
-              <a:rPr lang="en-US" dirty="0" smtClean="0"/>
-              <a:t> et aux </a:t>
-            </a:r>
-            <a:r>
-              <a:rPr lang="en-US" dirty="0" err="1" smtClean="0"/>
-              <a:t>fonctionnalités</a:t>
-            </a:r>
-            <a:r>
-              <a:rPr lang="en-US" dirty="0" smtClean="0"/>
-              <a:t> à travers </a:t>
-            </a:r>
-            <a:r>
-              <a:rPr lang="en-US" dirty="0" err="1" smtClean="0"/>
-              <a:t>notre</a:t>
-            </a:r>
-            <a:r>
-              <a:rPr lang="en-US" dirty="0" smtClean="0"/>
-              <a:t> application mobile et web. Nous </a:t>
-            </a:r>
-            <a:r>
-              <a:rPr lang="en-US" dirty="0" err="1" smtClean="0"/>
-              <a:t>allons</a:t>
-            </a:r>
-            <a:r>
-              <a:rPr lang="en-US" dirty="0" smtClean="0"/>
-              <a:t> </a:t>
-            </a:r>
-            <a:r>
-              <a:rPr lang="en-US" dirty="0" err="1" smtClean="0"/>
-              <a:t>ici</a:t>
-            </a:r>
-            <a:r>
-              <a:rPr lang="en-US" dirty="0" smtClean="0"/>
-              <a:t> </a:t>
-            </a:r>
-            <a:r>
-              <a:rPr lang="en-US" dirty="0" err="1" smtClean="0"/>
-              <a:t>gérer</a:t>
-            </a:r>
-            <a:r>
-              <a:rPr lang="en-US" dirty="0" smtClean="0"/>
-              <a:t> </a:t>
-            </a:r>
-            <a:r>
-              <a:rPr lang="en-US" dirty="0" err="1" smtClean="0"/>
-              <a:t>toute</a:t>
-            </a:r>
-            <a:r>
-              <a:rPr lang="en-US" dirty="0" smtClean="0"/>
-              <a:t> la </a:t>
-            </a:r>
-            <a:r>
-              <a:rPr lang="en-US" dirty="0" err="1" smtClean="0"/>
-              <a:t>mise</a:t>
-            </a:r>
-            <a:r>
-              <a:rPr lang="en-US" dirty="0" smtClean="0"/>
-              <a:t> </a:t>
-            </a:r>
-            <a:r>
-              <a:rPr lang="en-US" dirty="0" err="1" smtClean="0"/>
-              <a:t>en</a:t>
-            </a:r>
-            <a:r>
-              <a:rPr lang="en-US" dirty="0" smtClean="0"/>
-              <a:t> place de </a:t>
-            </a:r>
-            <a:r>
-              <a:rPr lang="en-US" dirty="0" err="1" smtClean="0"/>
-              <a:t>notre</a:t>
-            </a:r>
-            <a:r>
-              <a:rPr lang="en-US" dirty="0" smtClean="0"/>
-              <a:t> application mobile (et web), </a:t>
-            </a:r>
-            <a:r>
-              <a:rPr lang="en-US" dirty="0" err="1" smtClean="0"/>
-              <a:t>ainsi</a:t>
-            </a:r>
-            <a:r>
-              <a:rPr lang="en-US" dirty="0" smtClean="0"/>
-              <a:t> que les </a:t>
-            </a:r>
-            <a:r>
-              <a:rPr lang="en-US" dirty="0" err="1" smtClean="0"/>
-              <a:t>différentes</a:t>
-            </a:r>
-            <a:r>
-              <a:rPr lang="en-US" dirty="0" smtClean="0"/>
-              <a:t> API </a:t>
-            </a:r>
-            <a:r>
-              <a:rPr lang="en-US" dirty="0" err="1" smtClean="0"/>
-              <a:t>nécessaires</a:t>
-            </a:r>
-            <a:r>
-              <a:rPr lang="en-US" dirty="0" smtClean="0"/>
-              <a:t> pour </a:t>
-            </a:r>
-            <a:r>
-              <a:rPr lang="en-US" dirty="0" err="1" smtClean="0"/>
-              <a:t>accéder</a:t>
-            </a:r>
-            <a:r>
-              <a:rPr lang="en-US" dirty="0" smtClean="0"/>
-              <a:t> aux </a:t>
-            </a:r>
-            <a:r>
-              <a:rPr lang="en-US" dirty="0" err="1" smtClean="0"/>
-              <a:t>données</a:t>
-            </a:r>
-            <a:r>
-              <a:rPr lang="en-US" dirty="0" smtClean="0"/>
-              <a:t> et </a:t>
-            </a:r>
-            <a:r>
-              <a:rPr lang="en-US" dirty="0" err="1" smtClean="0"/>
-              <a:t>envoyer</a:t>
-            </a:r>
-            <a:r>
-              <a:rPr lang="en-US" dirty="0" smtClean="0"/>
-              <a:t> des instructions aux </a:t>
-            </a:r>
-            <a:r>
-              <a:rPr lang="en-US" dirty="0" err="1" smtClean="0"/>
-              <a:t>appareils</a:t>
-            </a:r>
-            <a:r>
-              <a:rPr lang="en-US" dirty="0" smtClean="0"/>
-              <a:t> </a:t>
-            </a:r>
-            <a:r>
-              <a:rPr lang="en-US" dirty="0" err="1" smtClean="0"/>
-              <a:t>distants</a:t>
-            </a:r>
-            <a:r>
-              <a:rPr lang="en-US" dirty="0"/>
-              <a:t>.</a:t>
+              <a:rPr lang="fr-FR" dirty="0"/>
+              <a:t>Nous détaillons ici que les grandes taches, à découper ensuite en plus petites fonctionnalités pour mieux se les répartir,</a:t>
+            </a:r>
+          </a:p>
+          <a:p>
+            <a:endParaRPr lang="fr-FR" dirty="0"/>
+          </a:p>
+          <a:p>
+            <a:r>
+              <a:rPr lang="fr-FR" dirty="0"/>
+              <a:t>Tâche 1 : Paramétrage de la Gateway et du robot, c’est à dire mettre en place tout l’environnement réseau pour que la </a:t>
+            </a:r>
+            <a:r>
+              <a:rPr lang="fr-FR" dirty="0" err="1"/>
+              <a:t>gateway</a:t>
+            </a:r>
+            <a:r>
+              <a:rPr lang="fr-FR" dirty="0"/>
+              <a:t> et le robot soient connectés, et que les informations transitent bien dans les deux sens sans problème.</a:t>
             </a:r>
           </a:p>
         </p:txBody>
@@ -8999,7 +9163,7 @@
           <p:cNvPr id="3" name="Text Placeholder 2">
             <a:extLst>
               <a:ext uri="{FF2B5EF4-FFF2-40B4-BE49-F238E27FC236}">
-                <a16:creationId xmlns:a16="http://schemas.microsoft.com/office/drawing/2014/main" xmlns="" id="{EBDB337E-4389-4B90-8B96-853A42017204}"/>
+                <a16:creationId xmlns="" xmlns:a16="http://schemas.microsoft.com/office/drawing/2014/main" id="{EBDB337E-4389-4B90-8B96-853A42017204}"/>
               </a:ext>
             </a:extLst>
           </p:cNvPr>
@@ -9036,7 +9200,7 @@
           <p:cNvPr id="4" name="Title 3">
             <a:extLst>
               <a:ext uri="{FF2B5EF4-FFF2-40B4-BE49-F238E27FC236}">
-                <a16:creationId xmlns:a16="http://schemas.microsoft.com/office/drawing/2014/main" xmlns="" id="{F9ED67B2-9414-4565-B91A-5A6339FF2E1B}"/>
+                <a16:creationId xmlns="" xmlns:a16="http://schemas.microsoft.com/office/drawing/2014/main" id="{F9ED67B2-9414-4565-B91A-5A6339FF2E1B}"/>
               </a:ext>
             </a:extLst>
           </p:cNvPr>
@@ -9062,11 +9226,11 @@
             </a:r>
             <a:r>
               <a:rPr lang="fr-FR" dirty="0"/>
-              <a:t> </a:t>
+              <a:t> [</a:t>
             </a:r>
             <a:r>
               <a:rPr lang="fr-FR" dirty="0" smtClean="0"/>
-              <a:t>[2/3]</a:t>
+              <a:t>1/3]</a:t>
             </a:r>
             <a:endParaRPr lang="en-US" dirty="0"/>
           </a:p>
@@ -9075,7 +9239,7 @@
     </p:spTree>
     <p:extLst>
       <p:ext uri="{BB962C8B-B14F-4D97-AF65-F5344CB8AC3E}">
-        <p14:creationId xmlns:p14="http://schemas.microsoft.com/office/powerpoint/2010/main" val="53273876"/>
+        <p14:creationId xmlns:p14="http://schemas.microsoft.com/office/powerpoint/2010/main" val="1969407979"/>
       </p:ext>
     </p:extLst>
   </p:cSld>

</xml_diff>

<commit_message>
Version finale de la prez et du pitch
</commit_message>
<xml_diff>
--- a/Projet/Presentation/Presentation_Groupe05.pptx
+++ b/Projet/Presentation/Presentation_Groupe05.pptx
@@ -1862,7 +1862,7 @@
           <p:cNvPr id="2" name="Title 1">
             <a:extLst>
               <a:ext uri="{FF2B5EF4-FFF2-40B4-BE49-F238E27FC236}">
-                <a16:creationId xmlns="" xmlns:a16="http://schemas.microsoft.com/office/drawing/2014/main" id="{75A2D3C5-0BBA-4475-A74A-9B10CE13EB0E}"/>
+                <a16:creationId xmlns:a16="http://schemas.microsoft.com/office/drawing/2014/main" xmlns="" id="{75A2D3C5-0BBA-4475-A74A-9B10CE13EB0E}"/>
               </a:ext>
             </a:extLst>
           </p:cNvPr>
@@ -2026,7 +2026,7 @@
           <p:cNvPr id="2" name="Title 1">
             <a:extLst>
               <a:ext uri="{FF2B5EF4-FFF2-40B4-BE49-F238E27FC236}">
-                <a16:creationId xmlns="" xmlns:a16="http://schemas.microsoft.com/office/drawing/2014/main" id="{45682A82-1886-4648-8B15-A4EEC660AA63}"/>
+                <a16:creationId xmlns:a16="http://schemas.microsoft.com/office/drawing/2014/main" xmlns="" id="{45682A82-1886-4648-8B15-A4EEC660AA63}"/>
               </a:ext>
             </a:extLst>
           </p:cNvPr>
@@ -2989,7 +2989,7 @@
           <p:cNvPr id="2" name="Title 1">
             <a:extLst>
               <a:ext uri="{FF2B5EF4-FFF2-40B4-BE49-F238E27FC236}">
-                <a16:creationId xmlns="" xmlns:a16="http://schemas.microsoft.com/office/drawing/2014/main" id="{A6382AAE-12BB-4123-9126-EC8008489960}"/>
+                <a16:creationId xmlns:a16="http://schemas.microsoft.com/office/drawing/2014/main" xmlns="" id="{A6382AAE-12BB-4123-9126-EC8008489960}"/>
               </a:ext>
             </a:extLst>
           </p:cNvPr>
@@ -5807,7 +5807,7 @@
           <p:cNvPr id="2" name="Picture 2" descr="RÃ©sultat de recherche d'images pour &quot;ynov lyon&quot;">
             <a:extLst>
               <a:ext uri="{FF2B5EF4-FFF2-40B4-BE49-F238E27FC236}">
-                <a16:creationId xmlns="" xmlns:a16="http://schemas.microsoft.com/office/drawing/2014/main" id="{92ABB00D-ADA6-4A5E-80E9-D89620C9233F}"/>
+                <a16:creationId xmlns:a16="http://schemas.microsoft.com/office/drawing/2014/main" xmlns="" id="{92ABB00D-ADA6-4A5E-80E9-D89620C9233F}"/>
               </a:ext>
             </a:extLst>
           </p:cNvPr>
@@ -6334,7 +6334,7 @@
           <p:cNvPr id="3" name="Text Placeholder 2">
             <a:extLst>
               <a:ext uri="{FF2B5EF4-FFF2-40B4-BE49-F238E27FC236}">
-                <a16:creationId xmlns="" xmlns:a16="http://schemas.microsoft.com/office/drawing/2014/main" id="{60DBFCC4-DB58-4F06-97D0-A741F5586722}"/>
+                <a16:creationId xmlns:a16="http://schemas.microsoft.com/office/drawing/2014/main" xmlns="" id="{60DBFCC4-DB58-4F06-97D0-A741F5586722}"/>
               </a:ext>
             </a:extLst>
           </p:cNvPr>
@@ -6367,7 +6367,7 @@
           <p:cNvPr id="1026" name="Picture 2" descr="RÃ©sultat de recherche d'images pour &quot;ynov lyon&quot;">
             <a:extLst>
               <a:ext uri="{FF2B5EF4-FFF2-40B4-BE49-F238E27FC236}">
-                <a16:creationId xmlns="" xmlns:a16="http://schemas.microsoft.com/office/drawing/2014/main" id="{6EB9BD3B-0D8D-4FB9-B6AA-34EEBF39FE67}"/>
+                <a16:creationId xmlns:a16="http://schemas.microsoft.com/office/drawing/2014/main" xmlns="" id="{6EB9BD3B-0D8D-4FB9-B6AA-34EEBF39FE67}"/>
               </a:ext>
             </a:extLst>
           </p:cNvPr>
@@ -6414,7 +6414,7 @@
           <p:cNvPr id="2" name="TextBox 1">
             <a:extLst>
               <a:ext uri="{FF2B5EF4-FFF2-40B4-BE49-F238E27FC236}">
-                <a16:creationId xmlns="" xmlns:a16="http://schemas.microsoft.com/office/drawing/2014/main" id="{0499A71F-347A-4043-B5B9-A2E6917C84E7}"/>
+                <a16:creationId xmlns:a16="http://schemas.microsoft.com/office/drawing/2014/main" xmlns="" id="{0499A71F-347A-4043-B5B9-A2E6917C84E7}"/>
               </a:ext>
             </a:extLst>
           </p:cNvPr>
@@ -6458,7 +6458,7 @@
           <p:cNvPr id="6" name="TextBox 5">
             <a:extLst>
               <a:ext uri="{FF2B5EF4-FFF2-40B4-BE49-F238E27FC236}">
-                <a16:creationId xmlns="" xmlns:a16="http://schemas.microsoft.com/office/drawing/2014/main" id="{A664C523-DC2F-4D39-853C-07F0BFDABF81}"/>
+                <a16:creationId xmlns:a16="http://schemas.microsoft.com/office/drawing/2014/main" xmlns="" id="{A664C523-DC2F-4D39-853C-07F0BFDABF81}"/>
               </a:ext>
             </a:extLst>
           </p:cNvPr>
@@ -6532,7 +6532,7 @@
           <p:cNvPr id="2" name="Text Placeholder 1">
             <a:extLst>
               <a:ext uri="{FF2B5EF4-FFF2-40B4-BE49-F238E27FC236}">
-                <a16:creationId xmlns="" xmlns:a16="http://schemas.microsoft.com/office/drawing/2014/main" id="{53DBDAB2-BE11-4B9D-85BC-5DE3D2A0A607}"/>
+                <a16:creationId xmlns:a16="http://schemas.microsoft.com/office/drawing/2014/main" xmlns="" id="{53DBDAB2-BE11-4B9D-85BC-5DE3D2A0A607}"/>
               </a:ext>
             </a:extLst>
           </p:cNvPr>
@@ -6732,7 +6732,7 @@
           <p:cNvPr id="3" name="Text Placeholder 2">
             <a:extLst>
               <a:ext uri="{FF2B5EF4-FFF2-40B4-BE49-F238E27FC236}">
-                <a16:creationId xmlns="" xmlns:a16="http://schemas.microsoft.com/office/drawing/2014/main" id="{EBDB337E-4389-4B90-8B96-853A42017204}"/>
+                <a16:creationId xmlns:a16="http://schemas.microsoft.com/office/drawing/2014/main" xmlns="" id="{EBDB337E-4389-4B90-8B96-853A42017204}"/>
               </a:ext>
             </a:extLst>
           </p:cNvPr>
@@ -6769,7 +6769,7 @@
           <p:cNvPr id="4" name="Title 3">
             <a:extLst>
               <a:ext uri="{FF2B5EF4-FFF2-40B4-BE49-F238E27FC236}">
-                <a16:creationId xmlns="" xmlns:a16="http://schemas.microsoft.com/office/drawing/2014/main" id="{F9ED67B2-9414-4565-B91A-5A6339FF2E1B}"/>
+                <a16:creationId xmlns:a16="http://schemas.microsoft.com/office/drawing/2014/main" xmlns="" id="{F9ED67B2-9414-4565-B91A-5A6339FF2E1B}"/>
               </a:ext>
             </a:extLst>
           </p:cNvPr>
@@ -6840,7 +6840,7 @@
           <p:cNvPr id="2" name="Text Placeholder 1">
             <a:extLst>
               <a:ext uri="{FF2B5EF4-FFF2-40B4-BE49-F238E27FC236}">
-                <a16:creationId xmlns="" xmlns:a16="http://schemas.microsoft.com/office/drawing/2014/main" id="{53DBDAB2-BE11-4B9D-85BC-5DE3D2A0A607}"/>
+                <a16:creationId xmlns:a16="http://schemas.microsoft.com/office/drawing/2014/main" xmlns="" id="{53DBDAB2-BE11-4B9D-85BC-5DE3D2A0A607}"/>
               </a:ext>
             </a:extLst>
           </p:cNvPr>
@@ -6980,7 +6980,7 @@
           <p:cNvPr id="3" name="Text Placeholder 2">
             <a:extLst>
               <a:ext uri="{FF2B5EF4-FFF2-40B4-BE49-F238E27FC236}">
-                <a16:creationId xmlns="" xmlns:a16="http://schemas.microsoft.com/office/drawing/2014/main" id="{EBDB337E-4389-4B90-8B96-853A42017204}"/>
+                <a16:creationId xmlns:a16="http://schemas.microsoft.com/office/drawing/2014/main" xmlns="" id="{EBDB337E-4389-4B90-8B96-853A42017204}"/>
               </a:ext>
             </a:extLst>
           </p:cNvPr>
@@ -7017,7 +7017,7 @@
           <p:cNvPr id="4" name="Title 3">
             <a:extLst>
               <a:ext uri="{FF2B5EF4-FFF2-40B4-BE49-F238E27FC236}">
-                <a16:creationId xmlns="" xmlns:a16="http://schemas.microsoft.com/office/drawing/2014/main" id="{F9ED67B2-9414-4565-B91A-5A6339FF2E1B}"/>
+                <a16:creationId xmlns:a16="http://schemas.microsoft.com/office/drawing/2014/main" xmlns="" id="{F9ED67B2-9414-4565-B91A-5A6339FF2E1B}"/>
               </a:ext>
             </a:extLst>
           </p:cNvPr>
@@ -7088,7 +7088,7 @@
           <p:cNvPr id="2" name="Text Placeholder 1">
             <a:extLst>
               <a:ext uri="{FF2B5EF4-FFF2-40B4-BE49-F238E27FC236}">
-                <a16:creationId xmlns="" xmlns:a16="http://schemas.microsoft.com/office/drawing/2014/main" id="{62737593-5087-4FE7-BE7B-97290A8959AA}"/>
+                <a16:creationId xmlns:a16="http://schemas.microsoft.com/office/drawing/2014/main" xmlns="" id="{62737593-5087-4FE7-BE7B-97290A8959AA}"/>
               </a:ext>
             </a:extLst>
           </p:cNvPr>
@@ -7115,6 +7115,16 @@
             </a:r>
           </a:p>
           <a:p>
+            <a:endParaRPr lang="fr-FR" dirty="0" smtClean="0"/>
+          </a:p>
+          <a:p>
+            <a:r>
+              <a:rPr lang="fr-FR" dirty="0" smtClean="0"/>
+              <a:t>On peut voir la colonne « extension » qui correspond à ce qui sort du scope initial, c’est-à-dire ce qu’on fera uniquement si on en a le temps.</a:t>
+            </a:r>
+            <a:endParaRPr lang="fr-FR" dirty="0"/>
+          </a:p>
+          <a:p>
             <a:endParaRPr lang="fr-FR" dirty="0"/>
           </a:p>
           <a:p>
@@ -7130,7 +7140,7 @@
           <p:cNvPr id="3" name="Text Placeholder 2">
             <a:extLst>
               <a:ext uri="{FF2B5EF4-FFF2-40B4-BE49-F238E27FC236}">
-                <a16:creationId xmlns="" xmlns:a16="http://schemas.microsoft.com/office/drawing/2014/main" id="{8013265B-6882-42AD-B306-1AACB5831960}"/>
+                <a16:creationId xmlns:a16="http://schemas.microsoft.com/office/drawing/2014/main" xmlns="" id="{8013265B-6882-42AD-B306-1AACB5831960}"/>
               </a:ext>
             </a:extLst>
           </p:cNvPr>
@@ -7167,7 +7177,7 @@
           <p:cNvPr id="4" name="Title 3">
             <a:extLst>
               <a:ext uri="{FF2B5EF4-FFF2-40B4-BE49-F238E27FC236}">
-                <a16:creationId xmlns="" xmlns:a16="http://schemas.microsoft.com/office/drawing/2014/main" id="{B58880D4-F928-4BAB-8F86-FB3A27D3AE1E}"/>
+                <a16:creationId xmlns:a16="http://schemas.microsoft.com/office/drawing/2014/main" xmlns="" id="{B58880D4-F928-4BAB-8F86-FB3A27D3AE1E}"/>
               </a:ext>
             </a:extLst>
           </p:cNvPr>
@@ -7197,22 +7207,28 @@
       </p:sp>
       <p:pic>
         <p:nvPicPr>
-          <p:cNvPr id="5" name="Image 4"/>
+          <p:cNvPr id="7" name="Image 6"/>
           <p:cNvPicPr>
             <a:picLocks noChangeAspect="1"/>
           </p:cNvPicPr>
           <p:nvPr/>
         </p:nvPicPr>
         <p:blipFill>
-          <a:blip r:embed="rId2"/>
+          <a:blip r:embed="rId2">
+            <a:extLst>
+              <a:ext uri="{28A0092B-C50C-407E-A947-70E740481C1C}">
+                <a14:useLocalDpi xmlns:a14="http://schemas.microsoft.com/office/drawing/2010/main" val="0"/>
+              </a:ext>
+            </a:extLst>
+          </a:blip>
           <a:stretch>
             <a:fillRect/>
           </a:stretch>
         </p:blipFill>
         <p:spPr>
           <a:xfrm>
-            <a:off x="6023992" y="620688"/>
-            <a:ext cx="5382013" cy="5859142"/>
+            <a:off x="4655840" y="1303095"/>
+            <a:ext cx="7322575" cy="5033054"/>
           </a:xfrm>
           <a:prstGeom prst="rect">
             <a:avLst/>
@@ -7254,7 +7270,7 @@
           <p:cNvPr id="2" name="Text Placeholder 1">
             <a:extLst>
               <a:ext uri="{FF2B5EF4-FFF2-40B4-BE49-F238E27FC236}">
-                <a16:creationId xmlns="" xmlns:a16="http://schemas.microsoft.com/office/drawing/2014/main" id="{62737593-5087-4FE7-BE7B-97290A8959AA}"/>
+                <a16:creationId xmlns:a16="http://schemas.microsoft.com/office/drawing/2014/main" xmlns="" id="{62737593-5087-4FE7-BE7B-97290A8959AA}"/>
               </a:ext>
             </a:extLst>
           </p:cNvPr>
@@ -7339,7 +7355,7 @@
           <p:cNvPr id="3" name="Text Placeholder 2">
             <a:extLst>
               <a:ext uri="{FF2B5EF4-FFF2-40B4-BE49-F238E27FC236}">
-                <a16:creationId xmlns="" xmlns:a16="http://schemas.microsoft.com/office/drawing/2014/main" id="{8013265B-6882-42AD-B306-1AACB5831960}"/>
+                <a16:creationId xmlns:a16="http://schemas.microsoft.com/office/drawing/2014/main" xmlns="" id="{8013265B-6882-42AD-B306-1AACB5831960}"/>
               </a:ext>
             </a:extLst>
           </p:cNvPr>
@@ -7376,7 +7392,7 @@
           <p:cNvPr id="4" name="Title 3">
             <a:extLst>
               <a:ext uri="{FF2B5EF4-FFF2-40B4-BE49-F238E27FC236}">
-                <a16:creationId xmlns="" xmlns:a16="http://schemas.microsoft.com/office/drawing/2014/main" id="{B58880D4-F928-4BAB-8F86-FB3A27D3AE1E}"/>
+                <a16:creationId xmlns:a16="http://schemas.microsoft.com/office/drawing/2014/main" xmlns="" id="{B58880D4-F928-4BAB-8F86-FB3A27D3AE1E}"/>
               </a:ext>
             </a:extLst>
           </p:cNvPr>
@@ -7447,7 +7463,7 @@
           <p:cNvPr id="2" name="Text Placeholder 1">
             <a:extLst>
               <a:ext uri="{FF2B5EF4-FFF2-40B4-BE49-F238E27FC236}">
-                <a16:creationId xmlns="" xmlns:a16="http://schemas.microsoft.com/office/drawing/2014/main" id="{62737593-5087-4FE7-BE7B-97290A8959AA}"/>
+                <a16:creationId xmlns:a16="http://schemas.microsoft.com/office/drawing/2014/main" xmlns="" id="{62737593-5087-4FE7-BE7B-97290A8959AA}"/>
               </a:ext>
             </a:extLst>
           </p:cNvPr>
@@ -7516,7 +7532,7 @@
           <p:cNvPr id="3" name="Text Placeholder 2">
             <a:extLst>
               <a:ext uri="{FF2B5EF4-FFF2-40B4-BE49-F238E27FC236}">
-                <a16:creationId xmlns="" xmlns:a16="http://schemas.microsoft.com/office/drawing/2014/main" id="{8013265B-6882-42AD-B306-1AACB5831960}"/>
+                <a16:creationId xmlns:a16="http://schemas.microsoft.com/office/drawing/2014/main" xmlns="" id="{8013265B-6882-42AD-B306-1AACB5831960}"/>
               </a:ext>
             </a:extLst>
           </p:cNvPr>
@@ -7553,7 +7569,7 @@
           <p:cNvPr id="4" name="Title 3">
             <a:extLst>
               <a:ext uri="{FF2B5EF4-FFF2-40B4-BE49-F238E27FC236}">
-                <a16:creationId xmlns="" xmlns:a16="http://schemas.microsoft.com/office/drawing/2014/main" id="{B58880D4-F928-4BAB-8F86-FB3A27D3AE1E}"/>
+                <a16:creationId xmlns:a16="http://schemas.microsoft.com/office/drawing/2014/main" xmlns="" id="{B58880D4-F928-4BAB-8F86-FB3A27D3AE1E}"/>
               </a:ext>
             </a:extLst>
           </p:cNvPr>
@@ -7616,7 +7632,7 @@
           <p:cNvPr id="2" name="Text Placeholder 1">
             <a:extLst>
               <a:ext uri="{FF2B5EF4-FFF2-40B4-BE49-F238E27FC236}">
-                <a16:creationId xmlns="" xmlns:a16="http://schemas.microsoft.com/office/drawing/2014/main" id="{576D1632-C889-465C-A567-CA185B1F9244}"/>
+                <a16:creationId xmlns:a16="http://schemas.microsoft.com/office/drawing/2014/main" xmlns="" id="{576D1632-C889-465C-A567-CA185B1F9244}"/>
               </a:ext>
             </a:extLst>
           </p:cNvPr>
@@ -7689,7 +7705,7 @@
           <p:cNvPr id="3" name="Text Placeholder 2">
             <a:extLst>
               <a:ext uri="{FF2B5EF4-FFF2-40B4-BE49-F238E27FC236}">
-                <a16:creationId xmlns="" xmlns:a16="http://schemas.microsoft.com/office/drawing/2014/main" id="{3CE1B846-8A60-40E5-B39B-A284E2BB3899}"/>
+                <a16:creationId xmlns:a16="http://schemas.microsoft.com/office/drawing/2014/main" xmlns="" id="{3CE1B846-8A60-40E5-B39B-A284E2BB3899}"/>
               </a:ext>
             </a:extLst>
           </p:cNvPr>
@@ -7737,7 +7753,7 @@
           <p:cNvPr id="4" name="Title 3">
             <a:extLst>
               <a:ext uri="{FF2B5EF4-FFF2-40B4-BE49-F238E27FC236}">
-                <a16:creationId xmlns="" xmlns:a16="http://schemas.microsoft.com/office/drawing/2014/main" id="{09ACD31A-B87D-43FD-8A7E-250C3FD8A9B0}"/>
+                <a16:creationId xmlns:a16="http://schemas.microsoft.com/office/drawing/2014/main" xmlns="" id="{09ACD31A-B87D-43FD-8A7E-250C3FD8A9B0}"/>
               </a:ext>
             </a:extLst>
           </p:cNvPr>
@@ -7796,7 +7812,7 @@
           <p:cNvPr id="2" name="Text Placeholder 1">
             <a:extLst>
               <a:ext uri="{FF2B5EF4-FFF2-40B4-BE49-F238E27FC236}">
-                <a16:creationId xmlns="" xmlns:a16="http://schemas.microsoft.com/office/drawing/2014/main" id="{57618B06-C8A8-4469-855E-61B392DFFAFC}"/>
+                <a16:creationId xmlns:a16="http://schemas.microsoft.com/office/drawing/2014/main" xmlns="" id="{57618B06-C8A8-4469-855E-61B392DFFAFC}"/>
               </a:ext>
             </a:extLst>
           </p:cNvPr>
@@ -7848,7 +7864,7 @@
           <p:cNvPr id="4" name="Title 3">
             <a:extLst>
               <a:ext uri="{FF2B5EF4-FFF2-40B4-BE49-F238E27FC236}">
-                <a16:creationId xmlns="" xmlns:a16="http://schemas.microsoft.com/office/drawing/2014/main" id="{A8E00CF9-B64D-475E-8EFD-166477C1CA41}"/>
+                <a16:creationId xmlns:a16="http://schemas.microsoft.com/office/drawing/2014/main" xmlns="" id="{A8E00CF9-B64D-475E-8EFD-166477C1CA41}"/>
               </a:ext>
             </a:extLst>
           </p:cNvPr>
@@ -7915,7 +7931,7 @@
           <p:cNvPr id="2" name="Text Placeholder 1">
             <a:extLst>
               <a:ext uri="{FF2B5EF4-FFF2-40B4-BE49-F238E27FC236}">
-                <a16:creationId xmlns="" xmlns:a16="http://schemas.microsoft.com/office/drawing/2014/main" id="{826A09AA-0F31-4462-9395-565580C8D524}"/>
+                <a16:creationId xmlns:a16="http://schemas.microsoft.com/office/drawing/2014/main" xmlns="" id="{826A09AA-0F31-4462-9395-565580C8D524}"/>
               </a:ext>
             </a:extLst>
           </p:cNvPr>
@@ -7960,7 +7976,7 @@
           <p:cNvPr id="3" name="Text Placeholder 2">
             <a:extLst>
               <a:ext uri="{FF2B5EF4-FFF2-40B4-BE49-F238E27FC236}">
-                <a16:creationId xmlns="" xmlns:a16="http://schemas.microsoft.com/office/drawing/2014/main" id="{5DCD3969-F3F4-474C-BFD9-B9942D360873}"/>
+                <a16:creationId xmlns:a16="http://schemas.microsoft.com/office/drawing/2014/main" xmlns="" id="{5DCD3969-F3F4-474C-BFD9-B9942D360873}"/>
               </a:ext>
             </a:extLst>
           </p:cNvPr>
@@ -7985,7 +8001,7 @@
           <p:cNvPr id="4" name="Title 3">
             <a:extLst>
               <a:ext uri="{FF2B5EF4-FFF2-40B4-BE49-F238E27FC236}">
-                <a16:creationId xmlns="" xmlns:a16="http://schemas.microsoft.com/office/drawing/2014/main" id="{83DD17B1-6CB7-4354-8701-009D08BAB665}"/>
+                <a16:creationId xmlns:a16="http://schemas.microsoft.com/office/drawing/2014/main" xmlns="" id="{83DD17B1-6CB7-4354-8701-009D08BAB665}"/>
               </a:ext>
             </a:extLst>
           </p:cNvPr>
@@ -8072,7 +8088,7 @@
           <p:cNvPr id="3" name="Text Placeholder 2">
             <a:extLst>
               <a:ext uri="{FF2B5EF4-FFF2-40B4-BE49-F238E27FC236}">
-                <a16:creationId xmlns="" xmlns:a16="http://schemas.microsoft.com/office/drawing/2014/main" id="{5DCD3969-F3F4-474C-BFD9-B9942D360873}"/>
+                <a16:creationId xmlns:a16="http://schemas.microsoft.com/office/drawing/2014/main" xmlns="" id="{5DCD3969-F3F4-474C-BFD9-B9942D360873}"/>
               </a:ext>
             </a:extLst>
           </p:cNvPr>
@@ -8109,7 +8125,7 @@
           <p:cNvPr id="4" name="Title 3">
             <a:extLst>
               <a:ext uri="{FF2B5EF4-FFF2-40B4-BE49-F238E27FC236}">
-                <a16:creationId xmlns="" xmlns:a16="http://schemas.microsoft.com/office/drawing/2014/main" id="{83DD17B1-6CB7-4354-8701-009D08BAB665}"/>
+                <a16:creationId xmlns:a16="http://schemas.microsoft.com/office/drawing/2014/main" xmlns="" id="{83DD17B1-6CB7-4354-8701-009D08BAB665}"/>
               </a:ext>
             </a:extLst>
           </p:cNvPr>
@@ -8213,7 +8229,7 @@
           <p:cNvPr id="2" name="Text Placeholder 1">
             <a:extLst>
               <a:ext uri="{FF2B5EF4-FFF2-40B4-BE49-F238E27FC236}">
-                <a16:creationId xmlns="" xmlns:a16="http://schemas.microsoft.com/office/drawing/2014/main" id="{6A753048-6BD6-4745-A479-DBAD34CB3216}"/>
+                <a16:creationId xmlns:a16="http://schemas.microsoft.com/office/drawing/2014/main" xmlns="" id="{6A753048-6BD6-4745-A479-DBAD34CB3216}"/>
               </a:ext>
             </a:extLst>
           </p:cNvPr>
@@ -8256,7 +8272,7 @@
           <p:cNvPr id="3" name="Text Placeholder 2">
             <a:extLst>
               <a:ext uri="{FF2B5EF4-FFF2-40B4-BE49-F238E27FC236}">
-                <a16:creationId xmlns="" xmlns:a16="http://schemas.microsoft.com/office/drawing/2014/main" id="{B5A8B3F6-F49D-4359-9E12-3F0C089B2E23}"/>
+                <a16:creationId xmlns:a16="http://schemas.microsoft.com/office/drawing/2014/main" xmlns="" id="{B5A8B3F6-F49D-4359-9E12-3F0C089B2E23}"/>
               </a:ext>
             </a:extLst>
           </p:cNvPr>
@@ -8293,7 +8309,7 @@
           <p:cNvPr id="4" name="Title 3">
             <a:extLst>
               <a:ext uri="{FF2B5EF4-FFF2-40B4-BE49-F238E27FC236}">
-                <a16:creationId xmlns="" xmlns:a16="http://schemas.microsoft.com/office/drawing/2014/main" id="{9E541666-6E26-4F40-A926-D9E557AF3D4F}"/>
+                <a16:creationId xmlns:a16="http://schemas.microsoft.com/office/drawing/2014/main" xmlns="" id="{9E541666-6E26-4F40-A926-D9E557AF3D4F}"/>
               </a:ext>
             </a:extLst>
           </p:cNvPr>
@@ -8356,7 +8372,7 @@
           <p:cNvPr id="2" name="Text Placeholder 1">
             <a:extLst>
               <a:ext uri="{FF2B5EF4-FFF2-40B4-BE49-F238E27FC236}">
-                <a16:creationId xmlns="" xmlns:a16="http://schemas.microsoft.com/office/drawing/2014/main" id="{6A753048-6BD6-4745-A479-DBAD34CB3216}"/>
+                <a16:creationId xmlns:a16="http://schemas.microsoft.com/office/drawing/2014/main" xmlns="" id="{6A753048-6BD6-4745-A479-DBAD34CB3216}"/>
               </a:ext>
             </a:extLst>
           </p:cNvPr>
@@ -8409,7 +8425,7 @@
           <p:cNvPr id="3" name="Text Placeholder 2">
             <a:extLst>
               <a:ext uri="{FF2B5EF4-FFF2-40B4-BE49-F238E27FC236}">
-                <a16:creationId xmlns="" xmlns:a16="http://schemas.microsoft.com/office/drawing/2014/main" id="{B5A8B3F6-F49D-4359-9E12-3F0C089B2E23}"/>
+                <a16:creationId xmlns:a16="http://schemas.microsoft.com/office/drawing/2014/main" xmlns="" id="{B5A8B3F6-F49D-4359-9E12-3F0C089B2E23}"/>
               </a:ext>
             </a:extLst>
           </p:cNvPr>
@@ -8446,7 +8462,7 @@
           <p:cNvPr id="4" name="Title 3">
             <a:extLst>
               <a:ext uri="{FF2B5EF4-FFF2-40B4-BE49-F238E27FC236}">
-                <a16:creationId xmlns="" xmlns:a16="http://schemas.microsoft.com/office/drawing/2014/main" id="{9E541666-6E26-4F40-A926-D9E557AF3D4F}"/>
+                <a16:creationId xmlns:a16="http://schemas.microsoft.com/office/drawing/2014/main" xmlns="" id="{9E541666-6E26-4F40-A926-D9E557AF3D4F}"/>
               </a:ext>
             </a:extLst>
           </p:cNvPr>
@@ -8509,7 +8525,7 @@
           <p:cNvPr id="2" name="Text Placeholder 1">
             <a:extLst>
               <a:ext uri="{FF2B5EF4-FFF2-40B4-BE49-F238E27FC236}">
-                <a16:creationId xmlns="" xmlns:a16="http://schemas.microsoft.com/office/drawing/2014/main" id="{B6F8AC67-6D9C-47B0-9C78-55034137C6E3}"/>
+                <a16:creationId xmlns:a16="http://schemas.microsoft.com/office/drawing/2014/main" xmlns="" id="{B6F8AC67-6D9C-47B0-9C78-55034137C6E3}"/>
               </a:ext>
             </a:extLst>
           </p:cNvPr>
@@ -8540,7 +8556,7 @@
           <p:cNvPr id="3" name="Text Placeholder 2">
             <a:extLst>
               <a:ext uri="{FF2B5EF4-FFF2-40B4-BE49-F238E27FC236}">
-                <a16:creationId xmlns="" xmlns:a16="http://schemas.microsoft.com/office/drawing/2014/main" id="{597D0BC2-3189-4626-BEAD-D450511C8E15}"/>
+                <a16:creationId xmlns:a16="http://schemas.microsoft.com/office/drawing/2014/main" xmlns="" id="{597D0BC2-3189-4626-BEAD-D450511C8E15}"/>
               </a:ext>
             </a:extLst>
           </p:cNvPr>
@@ -8577,7 +8593,7 @@
           <p:cNvPr id="4" name="Title 3">
             <a:extLst>
               <a:ext uri="{FF2B5EF4-FFF2-40B4-BE49-F238E27FC236}">
-                <a16:creationId xmlns="" xmlns:a16="http://schemas.microsoft.com/office/drawing/2014/main" id="{814F351C-F6DB-43DC-AD1C-1759C3C5EC88}"/>
+                <a16:creationId xmlns:a16="http://schemas.microsoft.com/office/drawing/2014/main" xmlns="" id="{814F351C-F6DB-43DC-AD1C-1759C3C5EC88}"/>
               </a:ext>
             </a:extLst>
           </p:cNvPr>
@@ -8681,7 +8697,7 @@
           <p:cNvPr id="2" name="Text Placeholder 1">
             <a:extLst>
               <a:ext uri="{FF2B5EF4-FFF2-40B4-BE49-F238E27FC236}">
-                <a16:creationId xmlns="" xmlns:a16="http://schemas.microsoft.com/office/drawing/2014/main" id="{B6F8AC67-6D9C-47B0-9C78-55034137C6E3}"/>
+                <a16:creationId xmlns:a16="http://schemas.microsoft.com/office/drawing/2014/main" xmlns="" id="{B6F8AC67-6D9C-47B0-9C78-55034137C6E3}"/>
               </a:ext>
             </a:extLst>
           </p:cNvPr>
@@ -8712,7 +8728,7 @@
           <p:cNvPr id="3" name="Text Placeholder 2">
             <a:extLst>
               <a:ext uri="{FF2B5EF4-FFF2-40B4-BE49-F238E27FC236}">
-                <a16:creationId xmlns="" xmlns:a16="http://schemas.microsoft.com/office/drawing/2014/main" id="{597D0BC2-3189-4626-BEAD-D450511C8E15}"/>
+                <a16:creationId xmlns:a16="http://schemas.microsoft.com/office/drawing/2014/main" xmlns="" id="{597D0BC2-3189-4626-BEAD-D450511C8E15}"/>
               </a:ext>
             </a:extLst>
           </p:cNvPr>
@@ -8749,7 +8765,7 @@
           <p:cNvPr id="4" name="Title 3">
             <a:extLst>
               <a:ext uri="{FF2B5EF4-FFF2-40B4-BE49-F238E27FC236}">
-                <a16:creationId xmlns="" xmlns:a16="http://schemas.microsoft.com/office/drawing/2014/main" id="{814F351C-F6DB-43DC-AD1C-1759C3C5EC88}"/>
+                <a16:creationId xmlns:a16="http://schemas.microsoft.com/office/drawing/2014/main" xmlns="" id="{814F351C-F6DB-43DC-AD1C-1759C3C5EC88}"/>
               </a:ext>
             </a:extLst>
           </p:cNvPr>
@@ -8782,7 +8798,7 @@
           <p:cNvPr id="6" name="Text Placeholder 1">
             <a:extLst>
               <a:ext uri="{FF2B5EF4-FFF2-40B4-BE49-F238E27FC236}">
-                <a16:creationId xmlns="" xmlns:a16="http://schemas.microsoft.com/office/drawing/2014/main" id="{53DBDAB2-BE11-4B9D-85BC-5DE3D2A0A607}"/>
+                <a16:creationId xmlns:a16="http://schemas.microsoft.com/office/drawing/2014/main" xmlns="" id="{53DBDAB2-BE11-4B9D-85BC-5DE3D2A0A607}"/>
               </a:ext>
             </a:extLst>
           </p:cNvPr>
@@ -9113,7 +9129,7 @@
           <p:cNvPr id="2" name="Text Placeholder 1">
             <a:extLst>
               <a:ext uri="{FF2B5EF4-FFF2-40B4-BE49-F238E27FC236}">
-                <a16:creationId xmlns="" xmlns:a16="http://schemas.microsoft.com/office/drawing/2014/main" id="{53DBDAB2-BE11-4B9D-85BC-5DE3D2A0A607}"/>
+                <a16:creationId xmlns:a16="http://schemas.microsoft.com/office/drawing/2014/main" xmlns="" id="{53DBDAB2-BE11-4B9D-85BC-5DE3D2A0A607}"/>
               </a:ext>
             </a:extLst>
           </p:cNvPr>
@@ -9163,7 +9179,7 @@
           <p:cNvPr id="3" name="Text Placeholder 2">
             <a:extLst>
               <a:ext uri="{FF2B5EF4-FFF2-40B4-BE49-F238E27FC236}">
-                <a16:creationId xmlns="" xmlns:a16="http://schemas.microsoft.com/office/drawing/2014/main" id="{EBDB337E-4389-4B90-8B96-853A42017204}"/>
+                <a16:creationId xmlns:a16="http://schemas.microsoft.com/office/drawing/2014/main" xmlns="" id="{EBDB337E-4389-4B90-8B96-853A42017204}"/>
               </a:ext>
             </a:extLst>
           </p:cNvPr>
@@ -9200,7 +9216,7 @@
           <p:cNvPr id="4" name="Title 3">
             <a:extLst>
               <a:ext uri="{FF2B5EF4-FFF2-40B4-BE49-F238E27FC236}">
-                <a16:creationId xmlns="" xmlns:a16="http://schemas.microsoft.com/office/drawing/2014/main" id="{F9ED67B2-9414-4565-B91A-5A6339FF2E1B}"/>
+                <a16:creationId xmlns:a16="http://schemas.microsoft.com/office/drawing/2014/main" xmlns="" id="{F9ED67B2-9414-4565-B91A-5A6339FF2E1B}"/>
               </a:ext>
             </a:extLst>
           </p:cNvPr>

</xml_diff>